<commit_message>
Updates to RCC Fall 2010. This is what I used in the presentation.
</commit_message>
<xml_diff>
--- a/RCC.2010.2/F.pptx
+++ b/RCC.2010.2/F.pptx
@@ -2,7 +2,7 @@
 <file path=ppt/presentation.xml><?xml version="1.0" encoding="utf-8"?>
 <p:presentation xmlns:a="http://schemas.openxmlformats.org/drawingml/2006/main" xmlns:r="http://schemas.openxmlformats.org/officeDocument/2006/relationships" xmlns:p="http://schemas.openxmlformats.org/presentationml/2006/main" saveSubsetFonts="1">
   <p:sldMasterIdLst>
-    <p:sldMasterId id="2147483648" r:id="rId1"/>
+    <p:sldMasterId id="2147483660" r:id="rId1"/>
   </p:sldMasterIdLst>
   <p:sldIdLst>
     <p:sldId id="256" r:id="rId2"/>
@@ -12,11 +12,16 @@
     <p:sldId id="260" r:id="rId6"/>
     <p:sldId id="261" r:id="rId7"/>
     <p:sldId id="262" r:id="rId8"/>
-    <p:sldId id="263" r:id="rId9"/>
-    <p:sldId id="264" r:id="rId10"/>
-    <p:sldId id="265" r:id="rId11"/>
-    <p:sldId id="266" r:id="rId12"/>
-    <p:sldId id="267" r:id="rId13"/>
+    <p:sldId id="268" r:id="rId9"/>
+    <p:sldId id="269" r:id="rId10"/>
+    <p:sldId id="270" r:id="rId11"/>
+    <p:sldId id="271" r:id="rId12"/>
+    <p:sldId id="263" r:id="rId13"/>
+    <p:sldId id="264" r:id="rId14"/>
+    <p:sldId id="265" r:id="rId15"/>
+    <p:sldId id="266" r:id="rId16"/>
+    <p:sldId id="267" r:id="rId17"/>
+    <p:sldId id="272" r:id="rId18"/>
   </p:sldIdLst>
   <p:sldSz cx="9144000" cy="6858000" type="screen4x3"/>
   <p:notesSz cx="6858000" cy="9144000"/>
@@ -127,11 +132,16 @@
             <p14:sldId id="260"/>
             <p14:sldId id="261"/>
             <p14:sldId id="262"/>
+            <p14:sldId id="268"/>
+            <p14:sldId id="269"/>
+            <p14:sldId id="270"/>
+            <p14:sldId id="271"/>
             <p14:sldId id="263"/>
             <p14:sldId id="264"/>
             <p14:sldId id="265"/>
             <p14:sldId id="266"/>
             <p14:sldId id="267"/>
+            <p14:sldId id="272"/>
           </p14:sldIdLst>
         </p14:section>
       </p14:sectionLst>
@@ -172,16 +182,25 @@
             <a:off x="685800" y="2130425"/>
             <a:ext cx="7772400" cy="1470025"/>
           </a:xfrm>
+          <a:noFill/>
         </p:spPr>
         <p:txBody>
           <a:bodyPr/>
-          <a:lstStyle/>
+          <a:lstStyle>
+            <a:lvl1pPr>
+              <a:defRPr>
+                <a:solidFill>
+                  <a:schemeClr val="tx1"/>
+                </a:solidFill>
+              </a:defRPr>
+            </a:lvl1pPr>
+          </a:lstStyle>
           <a:p>
             <a:r>
               <a:rPr lang="en-US" smtClean="0"/>
               <a:t>Click to edit Master title style</a:t>
             </a:r>
-            <a:endParaRPr lang="en-US"/>
+            <a:endParaRPr lang="en-US" dirty="0"/>
           </a:p>
         </p:txBody>
       </p:sp>
@@ -370,11 +389,6 @@
         </p:txBody>
       </p:sp>
     </p:spTree>
-    <p:extLst>
-      <p:ext uri="{BB962C8B-B14F-4D97-AF65-F5344CB8AC3E}">
-        <p14:creationId xmlns:p14="http://schemas.microsoft.com/office/powerpoint/2010/main" val="1308190876"/>
-      </p:ext>
-    </p:extLst>
   </p:cSld>
   <p:clrMapOvr>
     <a:masterClrMapping/>
@@ -383,6 +397,620 @@
 </file>
 
 <file path=ppt/slideLayouts/slideLayout10.xml><?xml version="1.0" encoding="utf-8"?>
+<p:sldLayout xmlns:a="http://schemas.openxmlformats.org/drawingml/2006/main" xmlns:r="http://schemas.openxmlformats.org/officeDocument/2006/relationships" xmlns:p="http://schemas.openxmlformats.org/presentationml/2006/main" type="blank" preserve="1">
+  <p:cSld name="Blank">
+    <p:spTree>
+      <p:nvGrpSpPr>
+        <p:cNvPr id="1" name=""/>
+        <p:cNvGrpSpPr/>
+        <p:nvPr/>
+      </p:nvGrpSpPr>
+      <p:grpSpPr>
+        <a:xfrm>
+          <a:off x="0" y="0"/>
+          <a:ext cx="0" cy="0"/>
+          <a:chOff x="0" y="0"/>
+          <a:chExt cx="0" cy="0"/>
+        </a:xfrm>
+      </p:grpSpPr>
+      <p:sp>
+        <p:nvSpPr>
+          <p:cNvPr id="2" name="Date Placeholder 1"/>
+          <p:cNvSpPr>
+            <a:spLocks noGrp="1"/>
+          </p:cNvSpPr>
+          <p:nvPr>
+            <p:ph type="dt" sz="half" idx="10"/>
+          </p:nvPr>
+        </p:nvSpPr>
+        <p:spPr/>
+        <p:txBody>
+          <a:bodyPr/>
+          <a:lstStyle/>
+          <a:p>
+            <a:fld id="{E5C3AB52-8376-44F3-AB22-C884EE719150}" type="datetimeFigureOut">
+              <a:rPr lang="en-US" smtClean="0"/>
+              <a:t>10/9/2010</a:t>
+            </a:fld>
+            <a:endParaRPr lang="en-US" dirty="0"/>
+          </a:p>
+        </p:txBody>
+      </p:sp>
+      <p:sp>
+        <p:nvSpPr>
+          <p:cNvPr id="3" name="Footer Placeholder 2"/>
+          <p:cNvSpPr>
+            <a:spLocks noGrp="1"/>
+          </p:cNvSpPr>
+          <p:nvPr>
+            <p:ph type="ftr" sz="quarter" idx="11"/>
+          </p:nvPr>
+        </p:nvSpPr>
+        <p:spPr/>
+        <p:txBody>
+          <a:bodyPr/>
+          <a:lstStyle/>
+          <a:p>
+            <a:endParaRPr lang="en-US" dirty="0"/>
+          </a:p>
+        </p:txBody>
+      </p:sp>
+      <p:sp>
+        <p:nvSpPr>
+          <p:cNvPr id="4" name="Slide Number Placeholder 3"/>
+          <p:cNvSpPr>
+            <a:spLocks noGrp="1"/>
+          </p:cNvSpPr>
+          <p:nvPr>
+            <p:ph type="sldNum" sz="quarter" idx="12"/>
+          </p:nvPr>
+        </p:nvSpPr>
+        <p:spPr/>
+        <p:txBody>
+          <a:bodyPr/>
+          <a:lstStyle/>
+          <a:p>
+            <a:fld id="{565BDC16-BFC3-45AD-B74A-62A67B0628C0}" type="slidenum">
+              <a:rPr lang="en-US" smtClean="0"/>
+              <a:t>‹#›</a:t>
+            </a:fld>
+            <a:endParaRPr lang="en-US" dirty="0"/>
+          </a:p>
+        </p:txBody>
+      </p:sp>
+    </p:spTree>
+  </p:cSld>
+  <p:clrMapOvr>
+    <a:masterClrMapping/>
+  </p:clrMapOvr>
+</p:sldLayout>
+</file>
+
+<file path=ppt/slideLayouts/slideLayout11.xml><?xml version="1.0" encoding="utf-8"?>
+<p:sldLayout xmlns:a="http://schemas.openxmlformats.org/drawingml/2006/main" xmlns:r="http://schemas.openxmlformats.org/officeDocument/2006/relationships" xmlns:p="http://schemas.openxmlformats.org/presentationml/2006/main" type="objTx" preserve="1">
+  <p:cSld name="Content with Caption">
+    <p:spTree>
+      <p:nvGrpSpPr>
+        <p:cNvPr id="1" name=""/>
+        <p:cNvGrpSpPr/>
+        <p:nvPr/>
+      </p:nvGrpSpPr>
+      <p:grpSpPr>
+        <a:xfrm>
+          <a:off x="0" y="0"/>
+          <a:ext cx="0" cy="0"/>
+          <a:chOff x="0" y="0"/>
+          <a:chExt cx="0" cy="0"/>
+        </a:xfrm>
+      </p:grpSpPr>
+      <p:sp>
+        <p:nvSpPr>
+          <p:cNvPr id="2" name="Title 1"/>
+          <p:cNvSpPr>
+            <a:spLocks noGrp="1"/>
+          </p:cNvSpPr>
+          <p:nvPr>
+            <p:ph type="title"/>
+          </p:nvPr>
+        </p:nvSpPr>
+        <p:spPr>
+          <a:xfrm>
+            <a:off x="457200" y="273050"/>
+            <a:ext cx="3008313" cy="1162050"/>
+          </a:xfrm>
+        </p:spPr>
+        <p:txBody>
+          <a:bodyPr anchor="b"/>
+          <a:lstStyle>
+            <a:lvl1pPr algn="l">
+              <a:defRPr sz="2000" b="1"/>
+            </a:lvl1pPr>
+          </a:lstStyle>
+          <a:p>
+            <a:r>
+              <a:rPr lang="en-US" smtClean="0"/>
+              <a:t>Click to edit Master title style</a:t>
+            </a:r>
+            <a:endParaRPr lang="en-US"/>
+          </a:p>
+        </p:txBody>
+      </p:sp>
+      <p:sp>
+        <p:nvSpPr>
+          <p:cNvPr id="3" name="Content Placeholder 2"/>
+          <p:cNvSpPr>
+            <a:spLocks noGrp="1"/>
+          </p:cNvSpPr>
+          <p:nvPr>
+            <p:ph idx="1"/>
+          </p:nvPr>
+        </p:nvSpPr>
+        <p:spPr>
+          <a:xfrm>
+            <a:off x="3575050" y="273050"/>
+            <a:ext cx="5111750" cy="5853113"/>
+          </a:xfrm>
+        </p:spPr>
+        <p:txBody>
+          <a:bodyPr/>
+          <a:lstStyle>
+            <a:lvl1pPr>
+              <a:defRPr sz="3200"/>
+            </a:lvl1pPr>
+            <a:lvl2pPr>
+              <a:defRPr sz="2800"/>
+            </a:lvl2pPr>
+            <a:lvl3pPr>
+              <a:defRPr sz="2400"/>
+            </a:lvl3pPr>
+            <a:lvl4pPr>
+              <a:defRPr sz="2000"/>
+            </a:lvl4pPr>
+            <a:lvl5pPr>
+              <a:defRPr sz="2000"/>
+            </a:lvl5pPr>
+            <a:lvl6pPr>
+              <a:defRPr sz="2000"/>
+            </a:lvl6pPr>
+            <a:lvl7pPr>
+              <a:defRPr sz="2000"/>
+            </a:lvl7pPr>
+            <a:lvl8pPr>
+              <a:defRPr sz="2000"/>
+            </a:lvl8pPr>
+            <a:lvl9pPr>
+              <a:defRPr sz="2000"/>
+            </a:lvl9pPr>
+          </a:lstStyle>
+          <a:p>
+            <a:pPr lvl="0"/>
+            <a:r>
+              <a:rPr lang="en-US" smtClean="0"/>
+              <a:t>Click to edit Master text styles</a:t>
+            </a:r>
+          </a:p>
+          <a:p>
+            <a:pPr lvl="1"/>
+            <a:r>
+              <a:rPr lang="en-US" smtClean="0"/>
+              <a:t>Second level</a:t>
+            </a:r>
+          </a:p>
+          <a:p>
+            <a:pPr lvl="2"/>
+            <a:r>
+              <a:rPr lang="en-US" smtClean="0"/>
+              <a:t>Third level</a:t>
+            </a:r>
+          </a:p>
+          <a:p>
+            <a:pPr lvl="3"/>
+            <a:r>
+              <a:rPr lang="en-US" smtClean="0"/>
+              <a:t>Fourth level</a:t>
+            </a:r>
+          </a:p>
+          <a:p>
+            <a:pPr lvl="4"/>
+            <a:r>
+              <a:rPr lang="en-US" smtClean="0"/>
+              <a:t>Fifth level</a:t>
+            </a:r>
+            <a:endParaRPr lang="en-US"/>
+          </a:p>
+        </p:txBody>
+      </p:sp>
+      <p:sp>
+        <p:nvSpPr>
+          <p:cNvPr id="4" name="Text Placeholder 3"/>
+          <p:cNvSpPr>
+            <a:spLocks noGrp="1"/>
+          </p:cNvSpPr>
+          <p:nvPr>
+            <p:ph type="body" sz="half" idx="2"/>
+          </p:nvPr>
+        </p:nvSpPr>
+        <p:spPr>
+          <a:xfrm>
+            <a:off x="457200" y="1435100"/>
+            <a:ext cx="3008313" cy="4691063"/>
+          </a:xfrm>
+        </p:spPr>
+        <p:txBody>
+          <a:bodyPr/>
+          <a:lstStyle>
+            <a:lvl1pPr marL="0" indent="0">
+              <a:buNone/>
+              <a:defRPr sz="1400"/>
+            </a:lvl1pPr>
+            <a:lvl2pPr marL="457200" indent="0">
+              <a:buNone/>
+              <a:defRPr sz="1200"/>
+            </a:lvl2pPr>
+            <a:lvl3pPr marL="914400" indent="0">
+              <a:buNone/>
+              <a:defRPr sz="1000"/>
+            </a:lvl3pPr>
+            <a:lvl4pPr marL="1371600" indent="0">
+              <a:buNone/>
+              <a:defRPr sz="900"/>
+            </a:lvl4pPr>
+            <a:lvl5pPr marL="1828800" indent="0">
+              <a:buNone/>
+              <a:defRPr sz="900"/>
+            </a:lvl5pPr>
+            <a:lvl6pPr marL="2286000" indent="0">
+              <a:buNone/>
+              <a:defRPr sz="900"/>
+            </a:lvl6pPr>
+            <a:lvl7pPr marL="2743200" indent="0">
+              <a:buNone/>
+              <a:defRPr sz="900"/>
+            </a:lvl7pPr>
+            <a:lvl8pPr marL="3200400" indent="0">
+              <a:buNone/>
+              <a:defRPr sz="900"/>
+            </a:lvl8pPr>
+            <a:lvl9pPr marL="3657600" indent="0">
+              <a:buNone/>
+              <a:defRPr sz="900"/>
+            </a:lvl9pPr>
+          </a:lstStyle>
+          <a:p>
+            <a:pPr lvl="0"/>
+            <a:r>
+              <a:rPr lang="en-US" smtClean="0"/>
+              <a:t>Click to edit Master text styles</a:t>
+            </a:r>
+          </a:p>
+        </p:txBody>
+      </p:sp>
+      <p:sp>
+        <p:nvSpPr>
+          <p:cNvPr id="5" name="Date Placeholder 4"/>
+          <p:cNvSpPr>
+            <a:spLocks noGrp="1"/>
+          </p:cNvSpPr>
+          <p:nvPr>
+            <p:ph type="dt" sz="half" idx="10"/>
+          </p:nvPr>
+        </p:nvSpPr>
+        <p:spPr/>
+        <p:txBody>
+          <a:bodyPr/>
+          <a:lstStyle/>
+          <a:p>
+            <a:fld id="{E5C3AB52-8376-44F3-AB22-C884EE719150}" type="datetimeFigureOut">
+              <a:rPr lang="en-US" smtClean="0"/>
+              <a:t>10/9/2010</a:t>
+            </a:fld>
+            <a:endParaRPr lang="en-US" dirty="0"/>
+          </a:p>
+        </p:txBody>
+      </p:sp>
+      <p:sp>
+        <p:nvSpPr>
+          <p:cNvPr id="6" name="Footer Placeholder 5"/>
+          <p:cNvSpPr>
+            <a:spLocks noGrp="1"/>
+          </p:cNvSpPr>
+          <p:nvPr>
+            <p:ph type="ftr" sz="quarter" idx="11"/>
+          </p:nvPr>
+        </p:nvSpPr>
+        <p:spPr/>
+        <p:txBody>
+          <a:bodyPr/>
+          <a:lstStyle/>
+          <a:p>
+            <a:endParaRPr lang="en-US" dirty="0"/>
+          </a:p>
+        </p:txBody>
+      </p:sp>
+      <p:sp>
+        <p:nvSpPr>
+          <p:cNvPr id="7" name="Slide Number Placeholder 6"/>
+          <p:cNvSpPr>
+            <a:spLocks noGrp="1"/>
+          </p:cNvSpPr>
+          <p:nvPr>
+            <p:ph type="sldNum" sz="quarter" idx="12"/>
+          </p:nvPr>
+        </p:nvSpPr>
+        <p:spPr/>
+        <p:txBody>
+          <a:bodyPr/>
+          <a:lstStyle/>
+          <a:p>
+            <a:fld id="{565BDC16-BFC3-45AD-B74A-62A67B0628C0}" type="slidenum">
+              <a:rPr lang="en-US" smtClean="0"/>
+              <a:t>‹#›</a:t>
+            </a:fld>
+            <a:endParaRPr lang="en-US" dirty="0"/>
+          </a:p>
+        </p:txBody>
+      </p:sp>
+    </p:spTree>
+  </p:cSld>
+  <p:clrMapOvr>
+    <a:masterClrMapping/>
+  </p:clrMapOvr>
+</p:sldLayout>
+</file>
+
+<file path=ppt/slideLayouts/slideLayout12.xml><?xml version="1.0" encoding="utf-8"?>
+<p:sldLayout xmlns:a="http://schemas.openxmlformats.org/drawingml/2006/main" xmlns:r="http://schemas.openxmlformats.org/officeDocument/2006/relationships" xmlns:p="http://schemas.openxmlformats.org/presentationml/2006/main" type="picTx" preserve="1">
+  <p:cSld name="Picture with Caption">
+    <p:spTree>
+      <p:nvGrpSpPr>
+        <p:cNvPr id="1" name=""/>
+        <p:cNvGrpSpPr/>
+        <p:nvPr/>
+      </p:nvGrpSpPr>
+      <p:grpSpPr>
+        <a:xfrm>
+          <a:off x="0" y="0"/>
+          <a:ext cx="0" cy="0"/>
+          <a:chOff x="0" y="0"/>
+          <a:chExt cx="0" cy="0"/>
+        </a:xfrm>
+      </p:grpSpPr>
+      <p:sp>
+        <p:nvSpPr>
+          <p:cNvPr id="2" name="Title 1"/>
+          <p:cNvSpPr>
+            <a:spLocks noGrp="1"/>
+          </p:cNvSpPr>
+          <p:nvPr>
+            <p:ph type="title"/>
+          </p:nvPr>
+        </p:nvSpPr>
+        <p:spPr>
+          <a:xfrm>
+            <a:off x="1792288" y="4800600"/>
+            <a:ext cx="5486400" cy="566738"/>
+          </a:xfrm>
+        </p:spPr>
+        <p:txBody>
+          <a:bodyPr anchor="b"/>
+          <a:lstStyle>
+            <a:lvl1pPr algn="l">
+              <a:defRPr sz="2000" b="1"/>
+            </a:lvl1pPr>
+          </a:lstStyle>
+          <a:p>
+            <a:r>
+              <a:rPr lang="en-US" smtClean="0"/>
+              <a:t>Click to edit Master title style</a:t>
+            </a:r>
+            <a:endParaRPr lang="en-US"/>
+          </a:p>
+        </p:txBody>
+      </p:sp>
+      <p:sp>
+        <p:nvSpPr>
+          <p:cNvPr id="3" name="Picture Placeholder 2"/>
+          <p:cNvSpPr>
+            <a:spLocks noGrp="1"/>
+          </p:cNvSpPr>
+          <p:nvPr>
+            <p:ph type="pic" idx="1"/>
+          </p:nvPr>
+        </p:nvSpPr>
+        <p:spPr>
+          <a:xfrm>
+            <a:off x="1792288" y="609600"/>
+            <a:ext cx="5486400" cy="4117975"/>
+          </a:xfrm>
+        </p:spPr>
+        <p:txBody>
+          <a:bodyPr/>
+          <a:lstStyle>
+            <a:lvl1pPr marL="0" indent="0">
+              <a:buNone/>
+              <a:defRPr sz="3200"/>
+            </a:lvl1pPr>
+            <a:lvl2pPr marL="457200" indent="0">
+              <a:buNone/>
+              <a:defRPr sz="2800"/>
+            </a:lvl2pPr>
+            <a:lvl3pPr marL="914400" indent="0">
+              <a:buNone/>
+              <a:defRPr sz="2400"/>
+            </a:lvl3pPr>
+            <a:lvl4pPr marL="1371600" indent="0">
+              <a:buNone/>
+              <a:defRPr sz="2000"/>
+            </a:lvl4pPr>
+            <a:lvl5pPr marL="1828800" indent="0">
+              <a:buNone/>
+              <a:defRPr sz="2000"/>
+            </a:lvl5pPr>
+            <a:lvl6pPr marL="2286000" indent="0">
+              <a:buNone/>
+              <a:defRPr sz="2000"/>
+            </a:lvl6pPr>
+            <a:lvl7pPr marL="2743200" indent="0">
+              <a:buNone/>
+              <a:defRPr sz="2000"/>
+            </a:lvl7pPr>
+            <a:lvl8pPr marL="3200400" indent="0">
+              <a:buNone/>
+              <a:defRPr sz="2000"/>
+            </a:lvl8pPr>
+            <a:lvl9pPr marL="3657600" indent="0">
+              <a:buNone/>
+              <a:defRPr sz="2000"/>
+            </a:lvl9pPr>
+          </a:lstStyle>
+          <a:p>
+            <a:r>
+              <a:rPr lang="en-US" smtClean="0"/>
+              <a:t>Click icon to add picture</a:t>
+            </a:r>
+            <a:endParaRPr lang="en-US" dirty="0"/>
+          </a:p>
+        </p:txBody>
+      </p:sp>
+      <p:sp>
+        <p:nvSpPr>
+          <p:cNvPr id="4" name="Text Placeholder 3"/>
+          <p:cNvSpPr>
+            <a:spLocks noGrp="1"/>
+          </p:cNvSpPr>
+          <p:nvPr>
+            <p:ph type="body" sz="half" idx="2"/>
+          </p:nvPr>
+        </p:nvSpPr>
+        <p:spPr>
+          <a:xfrm>
+            <a:off x="1792288" y="5367338"/>
+            <a:ext cx="5486400" cy="804862"/>
+          </a:xfrm>
+        </p:spPr>
+        <p:txBody>
+          <a:bodyPr/>
+          <a:lstStyle>
+            <a:lvl1pPr marL="0" indent="0">
+              <a:buNone/>
+              <a:defRPr sz="1400"/>
+            </a:lvl1pPr>
+            <a:lvl2pPr marL="457200" indent="0">
+              <a:buNone/>
+              <a:defRPr sz="1200"/>
+            </a:lvl2pPr>
+            <a:lvl3pPr marL="914400" indent="0">
+              <a:buNone/>
+              <a:defRPr sz="1000"/>
+            </a:lvl3pPr>
+            <a:lvl4pPr marL="1371600" indent="0">
+              <a:buNone/>
+              <a:defRPr sz="900"/>
+            </a:lvl4pPr>
+            <a:lvl5pPr marL="1828800" indent="0">
+              <a:buNone/>
+              <a:defRPr sz="900"/>
+            </a:lvl5pPr>
+            <a:lvl6pPr marL="2286000" indent="0">
+              <a:buNone/>
+              <a:defRPr sz="900"/>
+            </a:lvl6pPr>
+            <a:lvl7pPr marL="2743200" indent="0">
+              <a:buNone/>
+              <a:defRPr sz="900"/>
+            </a:lvl7pPr>
+            <a:lvl8pPr marL="3200400" indent="0">
+              <a:buNone/>
+              <a:defRPr sz="900"/>
+            </a:lvl8pPr>
+            <a:lvl9pPr marL="3657600" indent="0">
+              <a:buNone/>
+              <a:defRPr sz="900"/>
+            </a:lvl9pPr>
+          </a:lstStyle>
+          <a:p>
+            <a:pPr lvl="0"/>
+            <a:r>
+              <a:rPr lang="en-US" smtClean="0"/>
+              <a:t>Click to edit Master text styles</a:t>
+            </a:r>
+          </a:p>
+        </p:txBody>
+      </p:sp>
+      <p:sp>
+        <p:nvSpPr>
+          <p:cNvPr id="5" name="Date Placeholder 4"/>
+          <p:cNvSpPr>
+            <a:spLocks noGrp="1"/>
+          </p:cNvSpPr>
+          <p:nvPr>
+            <p:ph type="dt" sz="half" idx="10"/>
+          </p:nvPr>
+        </p:nvSpPr>
+        <p:spPr/>
+        <p:txBody>
+          <a:bodyPr/>
+          <a:lstStyle/>
+          <a:p>
+            <a:fld id="{E5C3AB52-8376-44F3-AB22-C884EE719150}" type="datetimeFigureOut">
+              <a:rPr lang="en-US" smtClean="0"/>
+              <a:t>10/9/2010</a:t>
+            </a:fld>
+            <a:endParaRPr lang="en-US" dirty="0"/>
+          </a:p>
+        </p:txBody>
+      </p:sp>
+      <p:sp>
+        <p:nvSpPr>
+          <p:cNvPr id="6" name="Footer Placeholder 5"/>
+          <p:cNvSpPr>
+            <a:spLocks noGrp="1"/>
+          </p:cNvSpPr>
+          <p:nvPr>
+            <p:ph type="ftr" sz="quarter" idx="11"/>
+          </p:nvPr>
+        </p:nvSpPr>
+        <p:spPr/>
+        <p:txBody>
+          <a:bodyPr/>
+          <a:lstStyle/>
+          <a:p>
+            <a:endParaRPr lang="en-US" dirty="0"/>
+          </a:p>
+        </p:txBody>
+      </p:sp>
+      <p:sp>
+        <p:nvSpPr>
+          <p:cNvPr id="7" name="Slide Number Placeholder 6"/>
+          <p:cNvSpPr>
+            <a:spLocks noGrp="1"/>
+          </p:cNvSpPr>
+          <p:nvPr>
+            <p:ph type="sldNum" sz="quarter" idx="12"/>
+          </p:nvPr>
+        </p:nvSpPr>
+        <p:spPr/>
+        <p:txBody>
+          <a:bodyPr/>
+          <a:lstStyle/>
+          <a:p>
+            <a:fld id="{565BDC16-BFC3-45AD-B74A-62A67B0628C0}" type="slidenum">
+              <a:rPr lang="en-US" smtClean="0"/>
+              <a:t>‹#›</a:t>
+            </a:fld>
+            <a:endParaRPr lang="en-US" dirty="0"/>
+          </a:p>
+        </p:txBody>
+      </p:sp>
+    </p:spTree>
+  </p:cSld>
+  <p:clrMapOvr>
+    <a:masterClrMapping/>
+  </p:clrMapOvr>
+</p:sldLayout>
+</file>
+
+<file path=ppt/slideLayouts/slideLayout13.xml><?xml version="1.0" encoding="utf-8"?>
 <p:sldLayout xmlns:a="http://schemas.openxmlformats.org/drawingml/2006/main" xmlns:r="http://schemas.openxmlformats.org/officeDocument/2006/relationships" xmlns:p="http://schemas.openxmlformats.org/presentationml/2006/main" type="vertTx" preserve="1">
   <p:cSld name="Title and Vertical Text">
     <p:spTree>
@@ -540,11 +1168,6 @@
         </p:txBody>
       </p:sp>
     </p:spTree>
-    <p:extLst>
-      <p:ext uri="{BB962C8B-B14F-4D97-AF65-F5344CB8AC3E}">
-        <p14:creationId xmlns:p14="http://schemas.microsoft.com/office/powerpoint/2010/main" val="1622456770"/>
-      </p:ext>
-    </p:extLst>
   </p:cSld>
   <p:clrMapOvr>
     <a:masterClrMapping/>
@@ -552,7 +1175,7 @@
 </p:sldLayout>
 </file>
 
-<file path=ppt/slideLayouts/slideLayout11.xml><?xml version="1.0" encoding="utf-8"?>
+<file path=ppt/slideLayouts/slideLayout14.xml><?xml version="1.0" encoding="utf-8"?>
 <p:sldLayout xmlns:a="http://schemas.openxmlformats.org/drawingml/2006/main" xmlns:r="http://schemas.openxmlformats.org/officeDocument/2006/relationships" xmlns:p="http://schemas.openxmlformats.org/presentationml/2006/main" type="vertTitleAndTx" preserve="1">
   <p:cSld name="Vertical Title and Text">
     <p:spTree>
@@ -720,11 +1343,6 @@
         </p:txBody>
       </p:sp>
     </p:spTree>
-    <p:extLst>
-      <p:ext uri="{BB962C8B-B14F-4D97-AF65-F5344CB8AC3E}">
-        <p14:creationId xmlns:p14="http://schemas.microsoft.com/office/powerpoint/2010/main" val="3532264869"/>
-      </p:ext>
-    </p:extLst>
   </p:cSld>
   <p:clrMapOvr>
     <a:masterClrMapping/>
@@ -890,15 +1508,17 @@
         </p:txBody>
       </p:sp>
     </p:spTree>
-    <p:extLst>
-      <p:ext uri="{BB962C8B-B14F-4D97-AF65-F5344CB8AC3E}">
-        <p14:creationId xmlns:p14="http://schemas.microsoft.com/office/powerpoint/2010/main" val="2605158665"/>
-      </p:ext>
-    </p:extLst>
   </p:cSld>
   <p:clrMapOvr>
     <a:masterClrMapping/>
   </p:clrMapOvr>
+  <p:timing>
+    <p:tnLst>
+      <p:par>
+        <p:cTn id="1" dur="indefinite" restart="never" nodeType="tmRoot"/>
+      </p:par>
+    </p:tnLst>
+  </p:timing>
 </p:sldLayout>
 </file>
 
@@ -1136,11 +1756,6 @@
         </p:txBody>
       </p:sp>
     </p:spTree>
-    <p:extLst>
-      <p:ext uri="{BB962C8B-B14F-4D97-AF65-F5344CB8AC3E}">
-        <p14:creationId xmlns:p14="http://schemas.microsoft.com/office/powerpoint/2010/main" val="1035938776"/>
-      </p:ext>
-    </p:extLst>
   </p:cSld>
   <p:clrMapOvr>
     <a:masterClrMapping/>
@@ -1200,8 +1815,8 @@
         </p:nvSpPr>
         <p:spPr>
           <a:xfrm>
-            <a:off x="457200" y="1600200"/>
-            <a:ext cx="4038600" cy="4525963"/>
+            <a:off x="457200" y="2057400"/>
+            <a:ext cx="4038600" cy="4068763"/>
           </a:xfrm>
         </p:spPr>
         <p:txBody>
@@ -1285,8 +1900,8 @@
         </p:nvSpPr>
         <p:spPr>
           <a:xfrm>
-            <a:off x="4648200" y="1600200"/>
-            <a:ext cx="4038600" cy="4525963"/>
+            <a:off x="4648200" y="2057400"/>
+            <a:ext cx="4038600" cy="4068763"/>
           </a:xfrm>
         </p:spPr>
         <p:txBody>
@@ -1424,11 +2039,6 @@
         </p:txBody>
       </p:sp>
     </p:spTree>
-    <p:extLst>
-      <p:ext uri="{BB962C8B-B14F-4D97-AF65-F5344CB8AC3E}">
-        <p14:creationId xmlns:p14="http://schemas.microsoft.com/office/powerpoint/2010/main" val="3918222745"/>
-      </p:ext>
-    </p:extLst>
   </p:cSld>
   <p:clrMapOvr>
     <a:masterClrMapping/>
@@ -1437,8 +2047,8 @@
 </file>
 
 <file path=ppt/slideLayouts/slideLayout5.xml><?xml version="1.0" encoding="utf-8"?>
-<p:sldLayout xmlns:a="http://schemas.openxmlformats.org/drawingml/2006/main" xmlns:r="http://schemas.openxmlformats.org/officeDocument/2006/relationships" xmlns:p="http://schemas.openxmlformats.org/presentationml/2006/main" type="twoTxTwoObj" preserve="1">
-  <p:cSld name="Comparison">
+<p:sldLayout xmlns:a="http://schemas.openxmlformats.org/drawingml/2006/main" xmlns:r="http://schemas.openxmlformats.org/officeDocument/2006/relationships" xmlns:p="http://schemas.openxmlformats.org/presentationml/2006/main" type="twoObj" preserve="1">
+  <p:cSld name="Two Content (25% / 75%)">
     <p:spTree>
       <p:nvGrpSpPr>
         <p:cNvPr id="1" name=""/>
@@ -1466,6 +2076,290 @@
         <p:spPr/>
         <p:txBody>
           <a:bodyPr/>
+          <a:lstStyle/>
+          <a:p>
+            <a:r>
+              <a:rPr lang="en-US" smtClean="0"/>
+              <a:t>Click to edit Master title style</a:t>
+            </a:r>
+            <a:endParaRPr lang="en-US"/>
+          </a:p>
+        </p:txBody>
+      </p:sp>
+      <p:sp>
+        <p:nvSpPr>
+          <p:cNvPr id="3" name="Content Placeholder 2"/>
+          <p:cNvSpPr>
+            <a:spLocks noGrp="1"/>
+          </p:cNvSpPr>
+          <p:nvPr>
+            <p:ph sz="half" idx="1"/>
+          </p:nvPr>
+        </p:nvSpPr>
+        <p:spPr>
+          <a:xfrm>
+            <a:off x="457200" y="2057400"/>
+            <a:ext cx="2438400" cy="4068763"/>
+          </a:xfrm>
+        </p:spPr>
+        <p:txBody>
+          <a:bodyPr/>
+          <a:lstStyle>
+            <a:lvl1pPr>
+              <a:defRPr sz="2800"/>
+            </a:lvl1pPr>
+            <a:lvl2pPr>
+              <a:defRPr sz="2400"/>
+            </a:lvl2pPr>
+            <a:lvl3pPr>
+              <a:defRPr sz="2000"/>
+            </a:lvl3pPr>
+            <a:lvl4pPr>
+              <a:defRPr sz="1800"/>
+            </a:lvl4pPr>
+            <a:lvl5pPr>
+              <a:defRPr sz="1800"/>
+            </a:lvl5pPr>
+            <a:lvl6pPr>
+              <a:defRPr sz="1800"/>
+            </a:lvl6pPr>
+            <a:lvl7pPr>
+              <a:defRPr sz="1800"/>
+            </a:lvl7pPr>
+            <a:lvl8pPr>
+              <a:defRPr sz="1800"/>
+            </a:lvl8pPr>
+            <a:lvl9pPr>
+              <a:defRPr sz="1800"/>
+            </a:lvl9pPr>
+          </a:lstStyle>
+          <a:p>
+            <a:pPr lvl="0"/>
+            <a:r>
+              <a:rPr lang="en-US" smtClean="0"/>
+              <a:t>Click to edit Master text styles</a:t>
+            </a:r>
+          </a:p>
+          <a:p>
+            <a:pPr lvl="1"/>
+            <a:r>
+              <a:rPr lang="en-US" smtClean="0"/>
+              <a:t>Second level</a:t>
+            </a:r>
+          </a:p>
+          <a:p>
+            <a:pPr lvl="2"/>
+            <a:r>
+              <a:rPr lang="en-US" smtClean="0"/>
+              <a:t>Third level</a:t>
+            </a:r>
+          </a:p>
+          <a:p>
+            <a:pPr lvl="3"/>
+            <a:r>
+              <a:rPr lang="en-US" smtClean="0"/>
+              <a:t>Fourth level</a:t>
+            </a:r>
+          </a:p>
+          <a:p>
+            <a:pPr lvl="4"/>
+            <a:r>
+              <a:rPr lang="en-US" smtClean="0"/>
+              <a:t>Fifth level</a:t>
+            </a:r>
+            <a:endParaRPr lang="en-US" dirty="0"/>
+          </a:p>
+        </p:txBody>
+      </p:sp>
+      <p:sp>
+        <p:nvSpPr>
+          <p:cNvPr id="4" name="Content Placeholder 3"/>
+          <p:cNvSpPr>
+            <a:spLocks noGrp="1"/>
+          </p:cNvSpPr>
+          <p:nvPr>
+            <p:ph sz="half" idx="2"/>
+          </p:nvPr>
+        </p:nvSpPr>
+        <p:spPr>
+          <a:xfrm>
+            <a:off x="3048000" y="2057400"/>
+            <a:ext cx="5638800" cy="4068763"/>
+          </a:xfrm>
+        </p:spPr>
+        <p:txBody>
+          <a:bodyPr/>
+          <a:lstStyle>
+            <a:lvl1pPr>
+              <a:defRPr sz="2800"/>
+            </a:lvl1pPr>
+            <a:lvl2pPr>
+              <a:defRPr sz="2400"/>
+            </a:lvl2pPr>
+            <a:lvl3pPr>
+              <a:defRPr sz="2000"/>
+            </a:lvl3pPr>
+            <a:lvl4pPr>
+              <a:defRPr sz="1800"/>
+            </a:lvl4pPr>
+            <a:lvl5pPr>
+              <a:defRPr sz="1800"/>
+            </a:lvl5pPr>
+            <a:lvl6pPr>
+              <a:defRPr sz="1800"/>
+            </a:lvl6pPr>
+            <a:lvl7pPr>
+              <a:defRPr sz="1800"/>
+            </a:lvl7pPr>
+            <a:lvl8pPr>
+              <a:defRPr sz="1800"/>
+            </a:lvl8pPr>
+            <a:lvl9pPr>
+              <a:defRPr sz="1800"/>
+            </a:lvl9pPr>
+          </a:lstStyle>
+          <a:p>
+            <a:pPr lvl="0"/>
+            <a:r>
+              <a:rPr lang="en-US" smtClean="0"/>
+              <a:t>Click to edit Master text styles</a:t>
+            </a:r>
+          </a:p>
+          <a:p>
+            <a:pPr lvl="1"/>
+            <a:r>
+              <a:rPr lang="en-US" smtClean="0"/>
+              <a:t>Second level</a:t>
+            </a:r>
+          </a:p>
+          <a:p>
+            <a:pPr lvl="2"/>
+            <a:r>
+              <a:rPr lang="en-US" smtClean="0"/>
+              <a:t>Third level</a:t>
+            </a:r>
+          </a:p>
+          <a:p>
+            <a:pPr lvl="3"/>
+            <a:r>
+              <a:rPr lang="en-US" smtClean="0"/>
+              <a:t>Fourth level</a:t>
+            </a:r>
+          </a:p>
+          <a:p>
+            <a:pPr lvl="4"/>
+            <a:r>
+              <a:rPr lang="en-US" smtClean="0"/>
+              <a:t>Fifth level</a:t>
+            </a:r>
+            <a:endParaRPr lang="en-US" dirty="0"/>
+          </a:p>
+        </p:txBody>
+      </p:sp>
+      <p:sp>
+        <p:nvSpPr>
+          <p:cNvPr id="5" name="Date Placeholder 4"/>
+          <p:cNvSpPr>
+            <a:spLocks noGrp="1"/>
+          </p:cNvSpPr>
+          <p:nvPr>
+            <p:ph type="dt" sz="half" idx="10"/>
+          </p:nvPr>
+        </p:nvSpPr>
+        <p:spPr/>
+        <p:txBody>
+          <a:bodyPr/>
+          <a:lstStyle/>
+          <a:p>
+            <a:fld id="{E5C3AB52-8376-44F3-AB22-C884EE719150}" type="datetimeFigureOut">
+              <a:rPr lang="en-US" smtClean="0"/>
+              <a:t>10/9/2010</a:t>
+            </a:fld>
+            <a:endParaRPr lang="en-US" dirty="0"/>
+          </a:p>
+        </p:txBody>
+      </p:sp>
+      <p:sp>
+        <p:nvSpPr>
+          <p:cNvPr id="6" name="Footer Placeholder 5"/>
+          <p:cNvSpPr>
+            <a:spLocks noGrp="1"/>
+          </p:cNvSpPr>
+          <p:nvPr>
+            <p:ph type="ftr" sz="quarter" idx="11"/>
+          </p:nvPr>
+        </p:nvSpPr>
+        <p:spPr/>
+        <p:txBody>
+          <a:bodyPr/>
+          <a:lstStyle/>
+          <a:p>
+            <a:endParaRPr lang="en-US" dirty="0"/>
+          </a:p>
+        </p:txBody>
+      </p:sp>
+      <p:sp>
+        <p:nvSpPr>
+          <p:cNvPr id="7" name="Slide Number Placeholder 6"/>
+          <p:cNvSpPr>
+            <a:spLocks noGrp="1"/>
+          </p:cNvSpPr>
+          <p:nvPr>
+            <p:ph type="sldNum" sz="quarter" idx="12"/>
+          </p:nvPr>
+        </p:nvSpPr>
+        <p:spPr/>
+        <p:txBody>
+          <a:bodyPr/>
+          <a:lstStyle/>
+          <a:p>
+            <a:fld id="{565BDC16-BFC3-45AD-B74A-62A67B0628C0}" type="slidenum">
+              <a:rPr lang="en-US" smtClean="0"/>
+              <a:t>‹#›</a:t>
+            </a:fld>
+            <a:endParaRPr lang="en-US" dirty="0"/>
+          </a:p>
+        </p:txBody>
+      </p:sp>
+    </p:spTree>
+    <p:extLst/>
+  </p:cSld>
+  <p:clrMapOvr>
+    <a:masterClrMapping/>
+  </p:clrMapOvr>
+</p:sldLayout>
+</file>
+
+<file path=ppt/slideLayouts/slideLayout6.xml><?xml version="1.0" encoding="utf-8"?>
+<p:sldLayout xmlns:a="http://schemas.openxmlformats.org/drawingml/2006/main" xmlns:r="http://schemas.openxmlformats.org/officeDocument/2006/relationships" xmlns:p="http://schemas.openxmlformats.org/presentationml/2006/main" type="twoTxTwoObj" preserve="1">
+  <p:cSld name="Comparison (50% / 50%)">
+    <p:spTree>
+      <p:nvGrpSpPr>
+        <p:cNvPr id="1" name=""/>
+        <p:cNvGrpSpPr/>
+        <p:nvPr/>
+      </p:nvGrpSpPr>
+      <p:grpSpPr>
+        <a:xfrm>
+          <a:off x="0" y="0"/>
+          <a:ext cx="0" cy="0"/>
+          <a:chOff x="0" y="0"/>
+          <a:chExt cx="0" cy="0"/>
+        </a:xfrm>
+      </p:grpSpPr>
+      <p:sp>
+        <p:nvSpPr>
+          <p:cNvPr id="2" name="Title 1"/>
+          <p:cNvSpPr>
+            <a:spLocks noGrp="1"/>
+          </p:cNvSpPr>
+          <p:nvPr>
+            <p:ph type="title"/>
+          </p:nvPr>
+        </p:nvSpPr>
+        <p:spPr/>
+        <p:txBody>
+          <a:bodyPr/>
           <a:lstStyle>
             <a:lvl1pPr>
               <a:defRPr/>
@@ -1492,7 +2386,7 @@
         </p:nvSpPr>
         <p:spPr>
           <a:xfrm>
-            <a:off x="457200" y="1535113"/>
+            <a:off x="457200" y="2027238"/>
             <a:ext cx="4040188" cy="639762"/>
           </a:xfrm>
         </p:spPr>
@@ -1557,8 +2451,8 @@
         </p:nvSpPr>
         <p:spPr>
           <a:xfrm>
-            <a:off x="457200" y="2174875"/>
-            <a:ext cx="4040188" cy="3951288"/>
+            <a:off x="457200" y="2667001"/>
+            <a:ext cx="4040188" cy="3459162"/>
           </a:xfrm>
         </p:spPr>
         <p:txBody>
@@ -1626,7 +2520,7 @@
               <a:rPr lang="en-US" smtClean="0"/>
               <a:t>Fifth level</a:t>
             </a:r>
-            <a:endParaRPr lang="en-US"/>
+            <a:endParaRPr lang="en-US" dirty="0"/>
           </a:p>
         </p:txBody>
       </p:sp>
@@ -1642,7 +2536,7 @@
         </p:nvSpPr>
         <p:spPr>
           <a:xfrm>
-            <a:off x="4645025" y="1535113"/>
+            <a:off x="4645025" y="2027238"/>
             <a:ext cx="4041775" cy="639762"/>
           </a:xfrm>
         </p:spPr>
@@ -1707,8 +2601,8 @@
         </p:nvSpPr>
         <p:spPr>
           <a:xfrm>
-            <a:off x="4645025" y="2174875"/>
-            <a:ext cx="4041775" cy="3951288"/>
+            <a:off x="4645025" y="2666999"/>
+            <a:ext cx="4041775" cy="3459163"/>
           </a:xfrm>
         </p:spPr>
         <p:txBody>
@@ -1776,7 +2670,7 @@
               <a:rPr lang="en-US" smtClean="0"/>
               <a:t>Fifth level</a:t>
             </a:r>
-            <a:endParaRPr lang="en-US"/>
+            <a:endParaRPr lang="en-US" dirty="0"/>
           </a:p>
         </p:txBody>
       </p:sp>
@@ -1846,11 +2740,6 @@
         </p:txBody>
       </p:sp>
     </p:spTree>
-    <p:extLst>
-      <p:ext uri="{BB962C8B-B14F-4D97-AF65-F5344CB8AC3E}">
-        <p14:creationId xmlns:p14="http://schemas.microsoft.com/office/powerpoint/2010/main" val="129324716"/>
-      </p:ext>
-    </p:extLst>
   </p:cSld>
   <p:clrMapOvr>
     <a:masterClrMapping/>
@@ -1858,7 +2747,7 @@
 </p:sldLayout>
 </file>
 
-<file path=ppt/slideLayouts/slideLayout6.xml><?xml version="1.0" encoding="utf-8"?>
+<file path=ppt/slideLayouts/slideLayout7.xml><?xml version="1.0" encoding="utf-8"?>
 <p:sldLayout xmlns:a="http://schemas.openxmlformats.org/drawingml/2006/main" xmlns:r="http://schemas.openxmlformats.org/officeDocument/2006/relationships" xmlns:p="http://schemas.openxmlformats.org/presentationml/2006/main" type="titleOnly" preserve="1">
   <p:cSld name="Title Only">
     <p:spTree>
@@ -1964,21 +2853,23 @@
         </p:txBody>
       </p:sp>
     </p:spTree>
-    <p:extLst>
-      <p:ext uri="{BB962C8B-B14F-4D97-AF65-F5344CB8AC3E}">
-        <p14:creationId xmlns:p14="http://schemas.microsoft.com/office/powerpoint/2010/main" val="2387501009"/>
-      </p:ext>
-    </p:extLst>
   </p:cSld>
   <p:clrMapOvr>
     <a:masterClrMapping/>
   </p:clrMapOvr>
+  <p:timing>
+    <p:tnLst>
+      <p:par>
+        <p:cTn id="1" dur="indefinite" restart="never" nodeType="tmRoot"/>
+      </p:par>
+    </p:tnLst>
+  </p:timing>
 </p:sldLayout>
 </file>
 
-<file path=ppt/slideLayouts/slideLayout7.xml><?xml version="1.0" encoding="utf-8"?>
-<p:sldLayout xmlns:a="http://schemas.openxmlformats.org/drawingml/2006/main" xmlns:r="http://schemas.openxmlformats.org/officeDocument/2006/relationships" xmlns:p="http://schemas.openxmlformats.org/presentationml/2006/main" type="blank" preserve="1">
-  <p:cSld name="Blank">
+<file path=ppt/slideLayouts/slideLayout8.xml><?xml version="1.0" encoding="utf-8"?>
+<p:sldLayout xmlns:a="http://schemas.openxmlformats.org/drawingml/2006/main" xmlns:r="http://schemas.openxmlformats.org/officeDocument/2006/relationships" xmlns:p="http://schemas.openxmlformats.org/presentationml/2006/main" preserve="1">
+  <p:cSld name="Lab">
     <p:spTree>
       <p:nvGrpSpPr>
         <p:cNvPr id="1" name=""/>
@@ -1995,7 +2886,50 @@
       </p:grpSpPr>
       <p:sp>
         <p:nvSpPr>
-          <p:cNvPr id="2" name="Date Placeholder 1"/>
+          <p:cNvPr id="2" name="Title 1"/>
+          <p:cNvSpPr>
+            <a:spLocks noGrp="1"/>
+          </p:cNvSpPr>
+          <p:nvPr>
+            <p:ph type="title"/>
+          </p:nvPr>
+        </p:nvSpPr>
+        <p:spPr>
+          <a:xfrm>
+            <a:off x="2971800" y="4419600"/>
+            <a:ext cx="6096000" cy="685800"/>
+          </a:xfrm>
+        </p:spPr>
+        <p:txBody>
+          <a:bodyPr/>
+          <a:lstStyle>
+            <a:lvl1pPr>
+              <a:defRPr sz="4000" b="1">
+                <a:solidFill>
+                  <a:schemeClr val="accent3"/>
+                </a:solidFill>
+                <a:effectLst>
+                  <a:outerShdw blurRad="38100" dist="38100" dir="2700000" algn="tl">
+                    <a:srgbClr val="000000">
+                      <a:alpha val="43137"/>
+                    </a:srgbClr>
+                  </a:outerShdw>
+                </a:effectLst>
+              </a:defRPr>
+            </a:lvl1pPr>
+          </a:lstStyle>
+          <a:p>
+            <a:r>
+              <a:rPr lang="en-US" smtClean="0"/>
+              <a:t>Click to edit Master title style</a:t>
+            </a:r>
+            <a:endParaRPr lang="en-US" dirty="0"/>
+          </a:p>
+        </p:txBody>
+      </p:sp>
+      <p:sp>
+        <p:nvSpPr>
+          <p:cNvPr id="3" name="Date Placeholder 2"/>
           <p:cNvSpPr>
             <a:spLocks noGrp="1"/>
           </p:cNvSpPr>
@@ -2018,7 +2952,7 @@
       </p:sp>
       <p:sp>
         <p:nvSpPr>
-          <p:cNvPr id="3" name="Footer Placeholder 2"/>
+          <p:cNvPr id="4" name="Footer Placeholder 3"/>
           <p:cNvSpPr>
             <a:spLocks noGrp="1"/>
           </p:cNvSpPr>
@@ -2037,7 +2971,7 @@
       </p:sp>
       <p:sp>
         <p:nvSpPr>
-          <p:cNvPr id="4" name="Slide Number Placeholder 3"/>
+          <p:cNvPr id="5" name="Slide Number Placeholder 4"/>
           <p:cNvSpPr>
             <a:spLocks noGrp="1"/>
           </p:cNvSpPr>
@@ -2058,22 +2992,77 @@
           </a:p>
         </p:txBody>
       </p:sp>
+      <p:sp>
+        <p:nvSpPr>
+          <p:cNvPr id="7" name="Text Placeholder 6"/>
+          <p:cNvSpPr>
+            <a:spLocks noGrp="1"/>
+          </p:cNvSpPr>
+          <p:nvPr>
+            <p:ph type="body" sz="quarter" idx="13"/>
+          </p:nvPr>
+        </p:nvSpPr>
+        <p:spPr>
+          <a:xfrm>
+            <a:off x="0" y="2628900"/>
+            <a:ext cx="9144000" cy="1600200"/>
+          </a:xfrm>
+        </p:spPr>
+        <p:style>
+          <a:lnRef idx="1">
+            <a:schemeClr val="accent3"/>
+          </a:lnRef>
+          <a:fillRef idx="2">
+            <a:schemeClr val="accent3"/>
+          </a:fillRef>
+          <a:effectRef idx="1">
+            <a:schemeClr val="accent3"/>
+          </a:effectRef>
+          <a:fontRef idx="none"/>
+        </p:style>
+        <p:txBody>
+          <a:bodyPr anchor="ctr">
+            <a:noAutofit/>
+          </a:bodyPr>
+          <a:lstStyle>
+            <a:lvl1pPr marL="0" indent="0">
+              <a:buNone/>
+              <a:defRPr sz="7200"/>
+            </a:lvl1pPr>
+            <a:lvl2pPr marL="457200" indent="0">
+              <a:buFontTx/>
+              <a:buNone/>
+              <a:defRPr/>
+            </a:lvl2pPr>
+          </a:lstStyle>
+          <a:p>
+            <a:pPr lvl="0"/>
+            <a:r>
+              <a:rPr lang="en-US" smtClean="0"/>
+              <a:t>Click to edit Master text styles</a:t>
+            </a:r>
+          </a:p>
+        </p:txBody>
+      </p:sp>
     </p:spTree>
-    <p:extLst>
-      <p:ext uri="{BB962C8B-B14F-4D97-AF65-F5344CB8AC3E}">
-        <p14:creationId xmlns:p14="http://schemas.microsoft.com/office/powerpoint/2010/main" val="2578375666"/>
-      </p:ext>
-    </p:extLst>
+    <p:extLst/>
   </p:cSld>
   <p:clrMapOvr>
     <a:masterClrMapping/>
   </p:clrMapOvr>
+  <p:timing>
+    <p:tnLst>
+      <p:par>
+        <p:cTn id="1" dur="indefinite" restart="never" nodeType="tmRoot"/>
+      </p:par>
+    </p:tnLst>
+  </p:timing>
 </p:sldLayout>
 </file>
 
-<file path=ppt/slideLayouts/slideLayout8.xml><?xml version="1.0" encoding="utf-8"?>
-<p:sldLayout xmlns:a="http://schemas.openxmlformats.org/drawingml/2006/main" xmlns:r="http://schemas.openxmlformats.org/officeDocument/2006/relationships" xmlns:p="http://schemas.openxmlformats.org/presentationml/2006/main" type="objTx" preserve="1">
-  <p:cSld name="Content with Caption">
+<file path=ppt/slideLayouts/slideLayout9.xml><?xml version="1.0" encoding="utf-8"?>
+<p:sldLayout xmlns:a="http://schemas.openxmlformats.org/drawingml/2006/main" xmlns:r="http://schemas.openxmlformats.org/officeDocument/2006/relationships" xmlns:p="http://schemas.openxmlformats.org/presentationml/2006/main" type="titleOnly" preserve="1">
+  <p:cSld name="Large Title">
     <p:spTree>
       <p:nvGrpSpPr>
         <p:cNvPr id="1" name=""/>
@@ -2100,15 +3089,17 @@
         </p:nvSpPr>
         <p:spPr>
           <a:xfrm>
-            <a:off x="457200" y="273050"/>
-            <a:ext cx="3008313" cy="1162050"/>
+            <a:off x="457200" y="2156619"/>
+            <a:ext cx="8229600" cy="2544762"/>
           </a:xfrm>
         </p:spPr>
         <p:txBody>
-          <a:bodyPr anchor="b"/>
+          <a:bodyPr>
+            <a:normAutofit/>
+          </a:bodyPr>
           <a:lstStyle>
-            <a:lvl1pPr algn="l">
-              <a:defRPr sz="2000" b="1"/>
+            <a:lvl1pPr>
+              <a:defRPr sz="6000"/>
             </a:lvl1pPr>
           </a:lstStyle>
           <a:p>
@@ -2116,163 +3107,13 @@
               <a:rPr lang="en-US" smtClean="0"/>
               <a:t>Click to edit Master title style</a:t>
             </a:r>
-            <a:endParaRPr lang="en-US"/>
-          </a:p>
-        </p:txBody>
-      </p:sp>
-      <p:sp>
-        <p:nvSpPr>
-          <p:cNvPr id="3" name="Content Placeholder 2"/>
-          <p:cNvSpPr>
-            <a:spLocks noGrp="1"/>
-          </p:cNvSpPr>
-          <p:nvPr>
-            <p:ph idx="1"/>
-          </p:nvPr>
-        </p:nvSpPr>
-        <p:spPr>
-          <a:xfrm>
-            <a:off x="3575050" y="273050"/>
-            <a:ext cx="5111750" cy="5853113"/>
-          </a:xfrm>
-        </p:spPr>
-        <p:txBody>
-          <a:bodyPr/>
-          <a:lstStyle>
-            <a:lvl1pPr>
-              <a:defRPr sz="3200"/>
-            </a:lvl1pPr>
-            <a:lvl2pPr>
-              <a:defRPr sz="2800"/>
-            </a:lvl2pPr>
-            <a:lvl3pPr>
-              <a:defRPr sz="2400"/>
-            </a:lvl3pPr>
-            <a:lvl4pPr>
-              <a:defRPr sz="2000"/>
-            </a:lvl4pPr>
-            <a:lvl5pPr>
-              <a:defRPr sz="2000"/>
-            </a:lvl5pPr>
-            <a:lvl6pPr>
-              <a:defRPr sz="2000"/>
-            </a:lvl6pPr>
-            <a:lvl7pPr>
-              <a:defRPr sz="2000"/>
-            </a:lvl7pPr>
-            <a:lvl8pPr>
-              <a:defRPr sz="2000"/>
-            </a:lvl8pPr>
-            <a:lvl9pPr>
-              <a:defRPr sz="2000"/>
-            </a:lvl9pPr>
-          </a:lstStyle>
-          <a:p>
-            <a:pPr lvl="0"/>
-            <a:r>
-              <a:rPr lang="en-US" smtClean="0"/>
-              <a:t>Click to edit Master text styles</a:t>
-            </a:r>
-          </a:p>
-          <a:p>
-            <a:pPr lvl="1"/>
-            <a:r>
-              <a:rPr lang="en-US" smtClean="0"/>
-              <a:t>Second level</a:t>
-            </a:r>
-          </a:p>
-          <a:p>
-            <a:pPr lvl="2"/>
-            <a:r>
-              <a:rPr lang="en-US" smtClean="0"/>
-              <a:t>Third level</a:t>
-            </a:r>
-          </a:p>
-          <a:p>
-            <a:pPr lvl="3"/>
-            <a:r>
-              <a:rPr lang="en-US" smtClean="0"/>
-              <a:t>Fourth level</a:t>
-            </a:r>
-          </a:p>
-          <a:p>
-            <a:pPr lvl="4"/>
-            <a:r>
-              <a:rPr lang="en-US" smtClean="0"/>
-              <a:t>Fifth level</a:t>
-            </a:r>
-            <a:endParaRPr lang="en-US"/>
-          </a:p>
-        </p:txBody>
-      </p:sp>
-      <p:sp>
-        <p:nvSpPr>
-          <p:cNvPr id="4" name="Text Placeholder 3"/>
-          <p:cNvSpPr>
-            <a:spLocks noGrp="1"/>
-          </p:cNvSpPr>
-          <p:nvPr>
-            <p:ph type="body" sz="half" idx="2"/>
-          </p:nvPr>
-        </p:nvSpPr>
-        <p:spPr>
-          <a:xfrm>
-            <a:off x="457200" y="1435100"/>
-            <a:ext cx="3008313" cy="4691063"/>
-          </a:xfrm>
-        </p:spPr>
-        <p:txBody>
-          <a:bodyPr/>
-          <a:lstStyle>
-            <a:lvl1pPr marL="0" indent="0">
-              <a:buNone/>
-              <a:defRPr sz="1400"/>
-            </a:lvl1pPr>
-            <a:lvl2pPr marL="457200" indent="0">
-              <a:buNone/>
-              <a:defRPr sz="1200"/>
-            </a:lvl2pPr>
-            <a:lvl3pPr marL="914400" indent="0">
-              <a:buNone/>
-              <a:defRPr sz="1000"/>
-            </a:lvl3pPr>
-            <a:lvl4pPr marL="1371600" indent="0">
-              <a:buNone/>
-              <a:defRPr sz="900"/>
-            </a:lvl4pPr>
-            <a:lvl5pPr marL="1828800" indent="0">
-              <a:buNone/>
-              <a:defRPr sz="900"/>
-            </a:lvl5pPr>
-            <a:lvl6pPr marL="2286000" indent="0">
-              <a:buNone/>
-              <a:defRPr sz="900"/>
-            </a:lvl6pPr>
-            <a:lvl7pPr marL="2743200" indent="0">
-              <a:buNone/>
-              <a:defRPr sz="900"/>
-            </a:lvl7pPr>
-            <a:lvl8pPr marL="3200400" indent="0">
-              <a:buNone/>
-              <a:defRPr sz="900"/>
-            </a:lvl8pPr>
-            <a:lvl9pPr marL="3657600" indent="0">
-              <a:buNone/>
-              <a:defRPr sz="900"/>
-            </a:lvl9pPr>
-          </a:lstStyle>
-          <a:p>
-            <a:pPr lvl="0"/>
-            <a:r>
-              <a:rPr lang="en-US" smtClean="0"/>
-              <a:t>Click to edit Master text styles</a:t>
-            </a:r>
-          </a:p>
-        </p:txBody>
-      </p:sp>
-      <p:sp>
-        <p:nvSpPr>
-          <p:cNvPr id="5" name="Date Placeholder 4"/>
+            <a:endParaRPr lang="en-US" dirty="0"/>
+          </a:p>
+        </p:txBody>
+      </p:sp>
+      <p:sp>
+        <p:nvSpPr>
+          <p:cNvPr id="3" name="Date Placeholder 2"/>
           <p:cNvSpPr>
             <a:spLocks noGrp="1"/>
           </p:cNvSpPr>
@@ -2295,7 +3136,7 @@
       </p:sp>
       <p:sp>
         <p:nvSpPr>
-          <p:cNvPr id="6" name="Footer Placeholder 5"/>
+          <p:cNvPr id="4" name="Footer Placeholder 3"/>
           <p:cNvSpPr>
             <a:spLocks noGrp="1"/>
           </p:cNvSpPr>
@@ -2314,7 +3155,7 @@
       </p:sp>
       <p:sp>
         <p:nvSpPr>
-          <p:cNvPr id="7" name="Slide Number Placeholder 6"/>
+          <p:cNvPr id="5" name="Slide Number Placeholder 4"/>
           <p:cNvSpPr>
             <a:spLocks noGrp="1"/>
           </p:cNvSpPr>
@@ -2336,264 +3177,7 @@
         </p:txBody>
       </p:sp>
     </p:spTree>
-    <p:extLst>
-      <p:ext uri="{BB962C8B-B14F-4D97-AF65-F5344CB8AC3E}">
-        <p14:creationId xmlns:p14="http://schemas.microsoft.com/office/powerpoint/2010/main" val="3927855775"/>
-      </p:ext>
-    </p:extLst>
-  </p:cSld>
-  <p:clrMapOvr>
-    <a:masterClrMapping/>
-  </p:clrMapOvr>
-</p:sldLayout>
-</file>
-
-<file path=ppt/slideLayouts/slideLayout9.xml><?xml version="1.0" encoding="utf-8"?>
-<p:sldLayout xmlns:a="http://schemas.openxmlformats.org/drawingml/2006/main" xmlns:r="http://schemas.openxmlformats.org/officeDocument/2006/relationships" xmlns:p="http://schemas.openxmlformats.org/presentationml/2006/main" type="picTx" preserve="1">
-  <p:cSld name="Picture with Caption">
-    <p:spTree>
-      <p:nvGrpSpPr>
-        <p:cNvPr id="1" name=""/>
-        <p:cNvGrpSpPr/>
-        <p:nvPr/>
-      </p:nvGrpSpPr>
-      <p:grpSpPr>
-        <a:xfrm>
-          <a:off x="0" y="0"/>
-          <a:ext cx="0" cy="0"/>
-          <a:chOff x="0" y="0"/>
-          <a:chExt cx="0" cy="0"/>
-        </a:xfrm>
-      </p:grpSpPr>
-      <p:sp>
-        <p:nvSpPr>
-          <p:cNvPr id="2" name="Title 1"/>
-          <p:cNvSpPr>
-            <a:spLocks noGrp="1"/>
-          </p:cNvSpPr>
-          <p:nvPr>
-            <p:ph type="title"/>
-          </p:nvPr>
-        </p:nvSpPr>
-        <p:spPr>
-          <a:xfrm>
-            <a:off x="1792288" y="4800600"/>
-            <a:ext cx="5486400" cy="566738"/>
-          </a:xfrm>
-        </p:spPr>
-        <p:txBody>
-          <a:bodyPr anchor="b"/>
-          <a:lstStyle>
-            <a:lvl1pPr algn="l">
-              <a:defRPr sz="2000" b="1"/>
-            </a:lvl1pPr>
-          </a:lstStyle>
-          <a:p>
-            <a:r>
-              <a:rPr lang="en-US" smtClean="0"/>
-              <a:t>Click to edit Master title style</a:t>
-            </a:r>
-            <a:endParaRPr lang="en-US"/>
-          </a:p>
-        </p:txBody>
-      </p:sp>
-      <p:sp>
-        <p:nvSpPr>
-          <p:cNvPr id="3" name="Picture Placeholder 2"/>
-          <p:cNvSpPr>
-            <a:spLocks noGrp="1"/>
-          </p:cNvSpPr>
-          <p:nvPr>
-            <p:ph type="pic" idx="1"/>
-          </p:nvPr>
-        </p:nvSpPr>
-        <p:spPr>
-          <a:xfrm>
-            <a:off x="1792288" y="612775"/>
-            <a:ext cx="5486400" cy="4114800"/>
-          </a:xfrm>
-        </p:spPr>
-        <p:txBody>
-          <a:bodyPr/>
-          <a:lstStyle>
-            <a:lvl1pPr marL="0" indent="0">
-              <a:buNone/>
-              <a:defRPr sz="3200"/>
-            </a:lvl1pPr>
-            <a:lvl2pPr marL="457200" indent="0">
-              <a:buNone/>
-              <a:defRPr sz="2800"/>
-            </a:lvl2pPr>
-            <a:lvl3pPr marL="914400" indent="0">
-              <a:buNone/>
-              <a:defRPr sz="2400"/>
-            </a:lvl3pPr>
-            <a:lvl4pPr marL="1371600" indent="0">
-              <a:buNone/>
-              <a:defRPr sz="2000"/>
-            </a:lvl4pPr>
-            <a:lvl5pPr marL="1828800" indent="0">
-              <a:buNone/>
-              <a:defRPr sz="2000"/>
-            </a:lvl5pPr>
-            <a:lvl6pPr marL="2286000" indent="0">
-              <a:buNone/>
-              <a:defRPr sz="2000"/>
-            </a:lvl6pPr>
-            <a:lvl7pPr marL="2743200" indent="0">
-              <a:buNone/>
-              <a:defRPr sz="2000"/>
-            </a:lvl7pPr>
-            <a:lvl8pPr marL="3200400" indent="0">
-              <a:buNone/>
-              <a:defRPr sz="2000"/>
-            </a:lvl8pPr>
-            <a:lvl9pPr marL="3657600" indent="0">
-              <a:buNone/>
-              <a:defRPr sz="2000"/>
-            </a:lvl9pPr>
-          </a:lstStyle>
-          <a:p>
-            <a:endParaRPr lang="en-US" dirty="0"/>
-          </a:p>
-        </p:txBody>
-      </p:sp>
-      <p:sp>
-        <p:nvSpPr>
-          <p:cNvPr id="4" name="Text Placeholder 3"/>
-          <p:cNvSpPr>
-            <a:spLocks noGrp="1"/>
-          </p:cNvSpPr>
-          <p:nvPr>
-            <p:ph type="body" sz="half" idx="2"/>
-          </p:nvPr>
-        </p:nvSpPr>
-        <p:spPr>
-          <a:xfrm>
-            <a:off x="1792288" y="5367338"/>
-            <a:ext cx="5486400" cy="804862"/>
-          </a:xfrm>
-        </p:spPr>
-        <p:txBody>
-          <a:bodyPr/>
-          <a:lstStyle>
-            <a:lvl1pPr marL="0" indent="0">
-              <a:buNone/>
-              <a:defRPr sz="1400"/>
-            </a:lvl1pPr>
-            <a:lvl2pPr marL="457200" indent="0">
-              <a:buNone/>
-              <a:defRPr sz="1200"/>
-            </a:lvl2pPr>
-            <a:lvl3pPr marL="914400" indent="0">
-              <a:buNone/>
-              <a:defRPr sz="1000"/>
-            </a:lvl3pPr>
-            <a:lvl4pPr marL="1371600" indent="0">
-              <a:buNone/>
-              <a:defRPr sz="900"/>
-            </a:lvl4pPr>
-            <a:lvl5pPr marL="1828800" indent="0">
-              <a:buNone/>
-              <a:defRPr sz="900"/>
-            </a:lvl5pPr>
-            <a:lvl6pPr marL="2286000" indent="0">
-              <a:buNone/>
-              <a:defRPr sz="900"/>
-            </a:lvl6pPr>
-            <a:lvl7pPr marL="2743200" indent="0">
-              <a:buNone/>
-              <a:defRPr sz="900"/>
-            </a:lvl7pPr>
-            <a:lvl8pPr marL="3200400" indent="0">
-              <a:buNone/>
-              <a:defRPr sz="900"/>
-            </a:lvl8pPr>
-            <a:lvl9pPr marL="3657600" indent="0">
-              <a:buNone/>
-              <a:defRPr sz="900"/>
-            </a:lvl9pPr>
-          </a:lstStyle>
-          <a:p>
-            <a:pPr lvl="0"/>
-            <a:r>
-              <a:rPr lang="en-US" smtClean="0"/>
-              <a:t>Click to edit Master text styles</a:t>
-            </a:r>
-          </a:p>
-        </p:txBody>
-      </p:sp>
-      <p:sp>
-        <p:nvSpPr>
-          <p:cNvPr id="5" name="Date Placeholder 4"/>
-          <p:cNvSpPr>
-            <a:spLocks noGrp="1"/>
-          </p:cNvSpPr>
-          <p:nvPr>
-            <p:ph type="dt" sz="half" idx="10"/>
-          </p:nvPr>
-        </p:nvSpPr>
-        <p:spPr/>
-        <p:txBody>
-          <a:bodyPr/>
-          <a:lstStyle/>
-          <a:p>
-            <a:fld id="{E5C3AB52-8376-44F3-AB22-C884EE719150}" type="datetimeFigureOut">
-              <a:rPr lang="en-US" smtClean="0"/>
-              <a:t>10/9/2010</a:t>
-            </a:fld>
-            <a:endParaRPr lang="en-US" dirty="0"/>
-          </a:p>
-        </p:txBody>
-      </p:sp>
-      <p:sp>
-        <p:nvSpPr>
-          <p:cNvPr id="6" name="Footer Placeholder 5"/>
-          <p:cNvSpPr>
-            <a:spLocks noGrp="1"/>
-          </p:cNvSpPr>
-          <p:nvPr>
-            <p:ph type="ftr" sz="quarter" idx="11"/>
-          </p:nvPr>
-        </p:nvSpPr>
-        <p:spPr/>
-        <p:txBody>
-          <a:bodyPr/>
-          <a:lstStyle/>
-          <a:p>
-            <a:endParaRPr lang="en-US" dirty="0"/>
-          </a:p>
-        </p:txBody>
-      </p:sp>
-      <p:sp>
-        <p:nvSpPr>
-          <p:cNvPr id="7" name="Slide Number Placeholder 6"/>
-          <p:cNvSpPr>
-            <a:spLocks noGrp="1"/>
-          </p:cNvSpPr>
-          <p:nvPr>
-            <p:ph type="sldNum" sz="quarter" idx="12"/>
-          </p:nvPr>
-        </p:nvSpPr>
-        <p:spPr/>
-        <p:txBody>
-          <a:bodyPr/>
-          <a:lstStyle/>
-          <a:p>
-            <a:fld id="{565BDC16-BFC3-45AD-B74A-62A67B0628C0}" type="slidenum">
-              <a:rPr lang="en-US" smtClean="0"/>
-              <a:t>‹#›</a:t>
-            </a:fld>
-            <a:endParaRPr lang="en-US" dirty="0"/>
-          </a:p>
-        </p:txBody>
-      </p:sp>
-    </p:spTree>
-    <p:extLst>
-      <p:ext uri="{BB962C8B-B14F-4D97-AF65-F5344CB8AC3E}">
-        <p14:creationId xmlns:p14="http://schemas.microsoft.com/office/powerpoint/2010/main" val="1611771494"/>
-      </p:ext>
-    </p:extLst>
+    <p:extLst/>
   </p:cSld>
   <p:clrMapOvr>
     <a:masterClrMapping/>
@@ -2607,7 +3191,7 @@
     <p:bg>
       <p:bgPr>
         <a:solidFill>
-          <a:srgbClr val="FFFFBB"/>
+          <a:schemeClr val="bg1"/>
         </a:solidFill>
         <a:effectLst/>
       </p:bgPr>
@@ -2628,6 +3212,114 @@
       </p:grpSpPr>
       <p:sp>
         <p:nvSpPr>
+          <p:cNvPr id="10" name="Rectangle 9"/>
+          <p:cNvSpPr/>
+          <p:nvPr/>
+        </p:nvSpPr>
+        <p:spPr>
+          <a:xfrm>
+            <a:off x="0" y="0"/>
+            <a:ext cx="9144000" cy="2057400"/>
+          </a:xfrm>
+          <a:prstGeom prst="rect">
+            <a:avLst/>
+          </a:prstGeom>
+          <a:blipFill dpi="0" rotWithShape="1">
+            <a:blip r:embed="rId16" cstate="print">
+              <a:duotone>
+                <a:schemeClr val="bg2">
+                  <a:shade val="45000"/>
+                  <a:satMod val="135000"/>
+                </a:schemeClr>
+                <a:prstClr val="white"/>
+              </a:duotone>
+            </a:blip>
+            <a:srcRect/>
+            <a:stretch>
+              <a:fillRect/>
+            </a:stretch>
+          </a:blipFill>
+          <a:ln>
+            <a:noFill/>
+          </a:ln>
+        </p:spPr>
+        <p:style>
+          <a:lnRef idx="2">
+            <a:schemeClr val="accent1">
+              <a:shade val="50000"/>
+            </a:schemeClr>
+          </a:lnRef>
+          <a:fillRef idx="1">
+            <a:schemeClr val="accent1"/>
+          </a:fillRef>
+          <a:effectRef idx="0">
+            <a:schemeClr val="accent1"/>
+          </a:effectRef>
+          <a:fontRef idx="minor">
+            <a:schemeClr val="lt1"/>
+          </a:fontRef>
+        </p:style>
+        <p:txBody>
+          <a:bodyPr rtlCol="0" anchor="ctr"/>
+          <a:lstStyle/>
+          <a:p>
+            <a:pPr algn="ctr"/>
+            <a:endParaRPr lang="en-US" dirty="0"/>
+          </a:p>
+        </p:txBody>
+      </p:sp>
+      <p:sp>
+        <p:nvSpPr>
+          <p:cNvPr id="7" name="Rectangle 6"/>
+          <p:cNvSpPr/>
+          <p:nvPr/>
+        </p:nvSpPr>
+        <p:spPr>
+          <a:xfrm>
+            <a:off x="0" y="6190488"/>
+            <a:ext cx="9144000" cy="694944"/>
+          </a:xfrm>
+          <a:prstGeom prst="rect">
+            <a:avLst/>
+          </a:prstGeom>
+          <a:blipFill dpi="0" rotWithShape="1">
+            <a:blip r:embed="rId17" cstate="print"/>
+            <a:srcRect/>
+            <a:stretch>
+              <a:fillRect/>
+            </a:stretch>
+          </a:blipFill>
+          <a:ln>
+            <a:noFill/>
+          </a:ln>
+        </p:spPr>
+        <p:style>
+          <a:lnRef idx="2">
+            <a:schemeClr val="accent1">
+              <a:shade val="50000"/>
+            </a:schemeClr>
+          </a:lnRef>
+          <a:fillRef idx="1">
+            <a:schemeClr val="accent1"/>
+          </a:fillRef>
+          <a:effectRef idx="0">
+            <a:schemeClr val="accent1"/>
+          </a:effectRef>
+          <a:fontRef idx="minor">
+            <a:schemeClr val="lt1"/>
+          </a:fontRef>
+        </p:style>
+        <p:txBody>
+          <a:bodyPr rtlCol="0" anchor="ctr"/>
+          <a:lstStyle/>
+          <a:p>
+            <a:pPr algn="ctr"/>
+            <a:endParaRPr lang="en-US" dirty="0"/>
+          </a:p>
+        </p:txBody>
+      </p:sp>
+      <p:sp>
+        <p:nvSpPr>
           <p:cNvPr id="2" name="Title Placeholder 1"/>
           <p:cNvSpPr>
             <a:spLocks noGrp="1"/>
@@ -2644,7 +3336,25 @@
           <a:prstGeom prst="rect">
             <a:avLst/>
           </a:prstGeom>
+          <a:noFill/>
+          <a:ln>
+            <a:noFill/>
+          </a:ln>
         </p:spPr>
+        <p:style>
+          <a:lnRef idx="2">
+            <a:schemeClr val="accent3">
+              <a:shade val="50000"/>
+            </a:schemeClr>
+          </a:lnRef>
+          <a:fillRef idx="1">
+            <a:schemeClr val="accent3"/>
+          </a:fillRef>
+          <a:effectRef idx="0">
+            <a:schemeClr val="accent3"/>
+          </a:effectRef>
+          <a:fontRef idx="none"/>
+        </p:style>
         <p:txBody>
           <a:bodyPr vert="horz" lIns="91440" tIns="45720" rIns="91440" bIns="45720" rtlCol="0" anchor="ctr">
             <a:normAutofit/>
@@ -2655,7 +3365,7 @@
               <a:rPr lang="en-US" smtClean="0"/>
               <a:t>Click to edit Master title style</a:t>
             </a:r>
-            <a:endParaRPr lang="en-US"/>
+            <a:endParaRPr lang="en-US" dirty="0"/>
           </a:p>
         </p:txBody>
       </p:sp>
@@ -2671,8 +3381,8 @@
         </p:nvSpPr>
         <p:spPr>
           <a:xfrm>
-            <a:off x="457200" y="1600200"/>
-            <a:ext cx="8229600" cy="4525963"/>
+            <a:off x="457200" y="2057400"/>
+            <a:ext cx="8229600" cy="4068763"/>
           </a:xfrm>
           <a:prstGeom prst="rect">
             <a:avLst/>
@@ -2717,7 +3427,7 @@
               <a:rPr lang="en-US" smtClean="0"/>
               <a:t>Fifth level</a:t>
             </a:r>
-            <a:endParaRPr lang="en-US"/>
+            <a:endParaRPr lang="en-US" dirty="0"/>
           </a:p>
         </p:txBody>
       </p:sp>
@@ -2733,7 +3443,7 @@
         </p:nvSpPr>
         <p:spPr>
           <a:xfrm>
-            <a:off x="457200" y="6356350"/>
+            <a:off x="457200" y="6324600"/>
             <a:ext cx="2133600" cy="365125"/>
           </a:xfrm>
           <a:prstGeom prst="rect">
@@ -2774,7 +3484,7 @@
         </p:nvSpPr>
         <p:spPr>
           <a:xfrm>
-            <a:off x="3124200" y="6356350"/>
+            <a:off x="3124200" y="6324600"/>
             <a:ext cx="2895600" cy="365125"/>
           </a:xfrm>
           <a:prstGeom prst="rect">
@@ -2811,8 +3521,8 @@
         </p:nvSpPr>
         <p:spPr>
           <a:xfrm>
-            <a:off x="6553200" y="6356350"/>
-            <a:ext cx="2133600" cy="365125"/>
+            <a:off x="6096000" y="6324600"/>
+            <a:ext cx="914400" cy="365125"/>
           </a:xfrm>
           <a:prstGeom prst="rect">
             <a:avLst/>
@@ -2841,26 +3551,31 @@
         </p:txBody>
       </p:sp>
     </p:spTree>
-    <p:extLst>
-      <p:ext uri="{BB962C8B-B14F-4D97-AF65-F5344CB8AC3E}">
-        <p14:creationId xmlns:p14="http://schemas.microsoft.com/office/powerpoint/2010/main" val="3505709135"/>
-      </p:ext>
-    </p:extLst>
   </p:cSld>
   <p:clrMap bg1="lt1" tx1="dk1" bg2="lt2" tx2="dk2" accent1="accent1" accent2="accent2" accent3="accent3" accent4="accent4" accent5="accent5" accent6="accent6" hlink="hlink" folHlink="folHlink"/>
   <p:sldLayoutIdLst>
-    <p:sldLayoutId id="2147483649" r:id="rId1"/>
-    <p:sldLayoutId id="2147483650" r:id="rId2"/>
-    <p:sldLayoutId id="2147483651" r:id="rId3"/>
-    <p:sldLayoutId id="2147483652" r:id="rId4"/>
-    <p:sldLayoutId id="2147483653" r:id="rId5"/>
-    <p:sldLayoutId id="2147483654" r:id="rId6"/>
-    <p:sldLayoutId id="2147483655" r:id="rId7"/>
-    <p:sldLayoutId id="2147483656" r:id="rId8"/>
-    <p:sldLayoutId id="2147483657" r:id="rId9"/>
-    <p:sldLayoutId id="2147483658" r:id="rId10"/>
-    <p:sldLayoutId id="2147483659" r:id="rId11"/>
+    <p:sldLayoutId id="2147483661" r:id="rId1"/>
+    <p:sldLayoutId id="2147483662" r:id="rId2"/>
+    <p:sldLayoutId id="2147483663" r:id="rId3"/>
+    <p:sldLayoutId id="2147483664" r:id="rId4"/>
+    <p:sldLayoutId id="2147483665" r:id="rId5"/>
+    <p:sldLayoutId id="2147483666" r:id="rId6"/>
+    <p:sldLayoutId id="2147483667" r:id="rId7"/>
+    <p:sldLayoutId id="2147483668" r:id="rId8"/>
+    <p:sldLayoutId id="2147483669" r:id="rId9"/>
+    <p:sldLayoutId id="2147483670" r:id="rId10"/>
+    <p:sldLayoutId id="2147483671" r:id="rId11"/>
+    <p:sldLayoutId id="2147483672" r:id="rId12"/>
+    <p:sldLayoutId id="2147483673" r:id="rId13"/>
+    <p:sldLayoutId id="2147483674" r:id="rId14"/>
   </p:sldLayoutIdLst>
+  <p:timing>
+    <p:tnLst>
+      <p:par>
+        <p:cTn id="1" dur="indefinite" restart="never" nodeType="tmRoot"/>
+      </p:par>
+    </p:tnLst>
+  </p:timing>
   <p:txStyles>
     <p:titleStyle>
       <a:lvl1pPr algn="ctr" defTabSz="914400" rtl="0" eaLnBrk="1" latinLnBrk="0" hangingPunct="1">
@@ -2868,10 +3583,14 @@
           <a:spcPct val="0"/>
         </a:spcBef>
         <a:buNone/>
-        <a:defRPr sz="4400" kern="1200">
+        <a:defRPr sz="4400" b="0" kern="1200" cap="none" spc="0">
+          <a:ln>
+            <a:noFill/>
+          </a:ln>
           <a:solidFill>
             <a:schemeClr val="tx1"/>
           </a:solidFill>
+          <a:effectLst/>
           <a:latin typeface="+mj-lt"/>
           <a:ea typeface="+mj-ea"/>
           <a:cs typeface="+mj-cs"/>
@@ -3238,6 +3957,822 @@
           <a:p>
             <a:r>
               <a:rPr lang="en-US" dirty="0" smtClean="0"/>
+              <a:t>Obligatory “Hello World”</a:t>
+            </a:r>
+            <a:endParaRPr lang="en-US" dirty="0"/>
+          </a:p>
+        </p:txBody>
+      </p:sp>
+      <p:sp>
+        <p:nvSpPr>
+          <p:cNvPr id="3" name="Content Placeholder 2"/>
+          <p:cNvSpPr>
+            <a:spLocks noGrp="1"/>
+          </p:cNvSpPr>
+          <p:nvPr>
+            <p:ph idx="1"/>
+          </p:nvPr>
+        </p:nvSpPr>
+        <p:spPr>
+          <a:xfrm>
+            <a:off x="609600" y="1600200"/>
+            <a:ext cx="8382000" cy="4525963"/>
+          </a:xfrm>
+        </p:spPr>
+        <p:txBody>
+          <a:bodyPr/>
+          <a:lstStyle/>
+          <a:p>
+            <a:pPr marL="0" indent="0">
+              <a:buNone/>
+            </a:pPr>
+            <a:r>
+              <a:rPr lang="en-US" dirty="0" smtClean="0"/>
+              <a:t>F#</a:t>
+            </a:r>
+            <a:endParaRPr lang="en-US" dirty="0"/>
+          </a:p>
+          <a:p>
+            <a:pPr marL="0" indent="0">
+              <a:buNone/>
+            </a:pPr>
+            <a:r>
+              <a:rPr lang="en-US" dirty="0" smtClean="0">
+                <a:solidFill>
+                  <a:srgbClr val="0000FF"/>
+                </a:solidFill>
+                <a:latin typeface="Consolas"/>
+              </a:rPr>
+              <a:t>let</a:t>
+            </a:r>
+            <a:r>
+              <a:rPr lang="en-US" dirty="0" smtClean="0">
+                <a:solidFill>
+                  <a:prstClr val="black"/>
+                </a:solidFill>
+                <a:latin typeface="Consolas"/>
+              </a:rPr>
+              <a:t> </a:t>
+            </a:r>
+            <a:r>
+              <a:rPr lang="en-US" dirty="0">
+                <a:solidFill>
+                  <a:prstClr val="black"/>
+                </a:solidFill>
+                <a:latin typeface="Consolas"/>
+              </a:rPr>
+              <a:t>text = </a:t>
+            </a:r>
+            <a:r>
+              <a:rPr lang="en-US" dirty="0">
+                <a:solidFill>
+                  <a:srgbClr val="800000"/>
+                </a:solidFill>
+                <a:latin typeface="Consolas"/>
+              </a:rPr>
+              <a:t>"Hello, World!"</a:t>
+            </a:r>
+            <a:endParaRPr lang="en-US" dirty="0">
+              <a:solidFill>
+                <a:prstClr val="black"/>
+              </a:solidFill>
+              <a:latin typeface="Consolas"/>
+            </a:endParaRPr>
+          </a:p>
+          <a:p>
+            <a:pPr marL="0" indent="0">
+              <a:buNone/>
+            </a:pPr>
+            <a:r>
+              <a:rPr lang="en-US" dirty="0" err="1">
+                <a:solidFill>
+                  <a:prstClr val="black"/>
+                </a:solidFill>
+                <a:latin typeface="Consolas"/>
+              </a:rPr>
+              <a:t>printf</a:t>
+            </a:r>
+            <a:r>
+              <a:rPr lang="en-US" dirty="0">
+                <a:solidFill>
+                  <a:prstClr val="black"/>
+                </a:solidFill>
+                <a:latin typeface="Consolas"/>
+              </a:rPr>
+              <a:t> </a:t>
+            </a:r>
+            <a:r>
+              <a:rPr lang="en-US" dirty="0">
+                <a:solidFill>
+                  <a:srgbClr val="800000"/>
+                </a:solidFill>
+                <a:latin typeface="Consolas"/>
+              </a:rPr>
+              <a:t>"%s"</a:t>
+            </a:r>
+            <a:r>
+              <a:rPr lang="en-US" dirty="0">
+                <a:solidFill>
+                  <a:prstClr val="black"/>
+                </a:solidFill>
+                <a:latin typeface="Consolas"/>
+              </a:rPr>
+              <a:t> text</a:t>
+            </a:r>
+          </a:p>
+          <a:p>
+            <a:endParaRPr lang="en-US" dirty="0" smtClean="0"/>
+          </a:p>
+          <a:p>
+            <a:pPr marL="0" indent="0">
+              <a:buNone/>
+            </a:pPr>
+            <a:r>
+              <a:rPr lang="en-US" dirty="0" smtClean="0"/>
+              <a:t>C#</a:t>
+            </a:r>
+            <a:endParaRPr lang="en-US" dirty="0"/>
+          </a:p>
+          <a:p>
+            <a:pPr marL="0" indent="0">
+              <a:buNone/>
+            </a:pPr>
+            <a:r>
+              <a:rPr lang="en-US" dirty="0" err="1">
+                <a:solidFill>
+                  <a:srgbClr val="0000FF"/>
+                </a:solidFill>
+                <a:latin typeface="Consolas"/>
+              </a:rPr>
+              <a:t>var</a:t>
+            </a:r>
+            <a:r>
+              <a:rPr lang="en-US" dirty="0">
+                <a:solidFill>
+                  <a:prstClr val="black"/>
+                </a:solidFill>
+                <a:latin typeface="Consolas"/>
+              </a:rPr>
+              <a:t> text = </a:t>
+            </a:r>
+            <a:r>
+              <a:rPr lang="en-US" dirty="0">
+                <a:solidFill>
+                  <a:srgbClr val="A31515"/>
+                </a:solidFill>
+                <a:latin typeface="Consolas"/>
+              </a:rPr>
+              <a:t>"Hello, World!"</a:t>
+            </a:r>
+            <a:endParaRPr lang="en-US" dirty="0">
+              <a:solidFill>
+                <a:prstClr val="black"/>
+              </a:solidFill>
+              <a:latin typeface="Consolas"/>
+            </a:endParaRPr>
+          </a:p>
+          <a:p>
+            <a:pPr marL="0" indent="0">
+              <a:buNone/>
+            </a:pPr>
+            <a:r>
+              <a:rPr lang="en-US" dirty="0" err="1">
+                <a:solidFill>
+                  <a:srgbClr val="2B91AF"/>
+                </a:solidFill>
+                <a:latin typeface="Consolas"/>
+              </a:rPr>
+              <a:t>Console</a:t>
+            </a:r>
+            <a:r>
+              <a:rPr lang="en-US" dirty="0" err="1">
+                <a:solidFill>
+                  <a:prstClr val="black"/>
+                </a:solidFill>
+                <a:latin typeface="Consolas"/>
+              </a:rPr>
+              <a:t>.Out.WriteLine</a:t>
+            </a:r>
+            <a:r>
+              <a:rPr lang="en-US" dirty="0">
+                <a:solidFill>
+                  <a:prstClr val="black"/>
+                </a:solidFill>
+                <a:latin typeface="Consolas"/>
+              </a:rPr>
+              <a:t>(</a:t>
+            </a:r>
+            <a:r>
+              <a:rPr lang="en-US" dirty="0">
+                <a:solidFill>
+                  <a:srgbClr val="A31515"/>
+                </a:solidFill>
+                <a:latin typeface="Consolas"/>
+              </a:rPr>
+              <a:t>"{0}"</a:t>
+            </a:r>
+            <a:r>
+              <a:rPr lang="en-US" dirty="0">
+                <a:solidFill>
+                  <a:prstClr val="black"/>
+                </a:solidFill>
+                <a:latin typeface="Consolas"/>
+              </a:rPr>
+              <a:t>, text);</a:t>
+            </a:r>
+          </a:p>
+          <a:p>
+            <a:endParaRPr lang="en-US" dirty="0"/>
+          </a:p>
+        </p:txBody>
+      </p:sp>
+    </p:spTree>
+    <p:extLst>
+      <p:ext uri="{BB962C8B-B14F-4D97-AF65-F5344CB8AC3E}">
+        <p14:creationId xmlns:p14="http://schemas.microsoft.com/office/powerpoint/2010/main" val="4040524111"/>
+      </p:ext>
+    </p:extLst>
+  </p:cSld>
+  <p:clrMapOvr>
+    <a:masterClrMapping/>
+  </p:clrMapOvr>
+  <p:timing>
+    <p:tnLst>
+      <p:par>
+        <p:cTn id="1" dur="indefinite" restart="never" nodeType="tmRoot"/>
+      </p:par>
+    </p:tnLst>
+  </p:timing>
+</p:sld>
+</file>
+
+<file path=ppt/slides/slide11.xml><?xml version="1.0" encoding="utf-8"?>
+<p:sld xmlns:a="http://schemas.openxmlformats.org/drawingml/2006/main" xmlns:r="http://schemas.openxmlformats.org/officeDocument/2006/relationships" xmlns:p="http://schemas.openxmlformats.org/presentationml/2006/main">
+  <p:cSld>
+    <p:spTree>
+      <p:nvGrpSpPr>
+        <p:cNvPr id="1" name=""/>
+        <p:cNvGrpSpPr/>
+        <p:nvPr/>
+      </p:nvGrpSpPr>
+      <p:grpSpPr>
+        <a:xfrm>
+          <a:off x="0" y="0"/>
+          <a:ext cx="0" cy="0"/>
+          <a:chOff x="0" y="0"/>
+          <a:chExt cx="0" cy="0"/>
+        </a:xfrm>
+      </p:grpSpPr>
+      <p:sp>
+        <p:nvSpPr>
+          <p:cNvPr id="2" name="Title 1"/>
+          <p:cNvSpPr>
+            <a:spLocks noGrp="1"/>
+          </p:cNvSpPr>
+          <p:nvPr>
+            <p:ph type="title"/>
+          </p:nvPr>
+        </p:nvSpPr>
+        <p:spPr/>
+        <p:txBody>
+          <a:bodyPr>
+            <a:normAutofit fontScale="90000"/>
+          </a:bodyPr>
+          <a:lstStyle/>
+          <a:p>
+            <a:r>
+              <a:rPr lang="en-US" dirty="0" smtClean="0"/>
+              <a:t>Syntax</a:t>
+            </a:r>
+            <a:br>
+              <a:rPr lang="en-US" dirty="0" smtClean="0"/>
+            </a:br>
+            <a:r>
+              <a:rPr lang="en-US" sz="2700" dirty="0" smtClean="0"/>
+              <a:t>To show you cool things, you need to be able to read them.</a:t>
+            </a:r>
+            <a:endParaRPr lang="en-US" sz="2700" dirty="0"/>
+          </a:p>
+        </p:txBody>
+      </p:sp>
+      <p:sp>
+        <p:nvSpPr>
+          <p:cNvPr id="3" name="Content Placeholder 2"/>
+          <p:cNvSpPr>
+            <a:spLocks noGrp="1"/>
+          </p:cNvSpPr>
+          <p:nvPr>
+            <p:ph idx="1"/>
+          </p:nvPr>
+        </p:nvSpPr>
+        <p:spPr/>
+        <p:txBody>
+          <a:bodyPr/>
+          <a:lstStyle/>
+          <a:p>
+            <a:r>
+              <a:rPr lang="en-US" dirty="0" smtClean="0"/>
+              <a:t>Let’s just look at some code</a:t>
+            </a:r>
+            <a:r>
+              <a:rPr lang="en-US" dirty="0" smtClean="0"/>
+              <a:t>.</a:t>
+            </a:r>
+          </a:p>
+          <a:p>
+            <a:r>
+              <a:rPr lang="en-US" dirty="0" smtClean="0"/>
+              <a:t>F# likes to keep everything generic.</a:t>
+            </a:r>
+          </a:p>
+          <a:p>
+            <a:r>
+              <a:rPr lang="en-US" dirty="0" smtClean="0"/>
+              <a:t>F# cares about whitespace.</a:t>
+            </a:r>
+          </a:p>
+          <a:p>
+            <a:pPr lvl="1"/>
+            <a:r>
+              <a:rPr lang="en-US" dirty="0" smtClean="0"/>
+              <a:t>This takes a while to get use to.</a:t>
+            </a:r>
+            <a:endParaRPr lang="en-US" dirty="0"/>
+          </a:p>
+        </p:txBody>
+      </p:sp>
+    </p:spTree>
+    <p:extLst>
+      <p:ext uri="{BB962C8B-B14F-4D97-AF65-F5344CB8AC3E}">
+        <p14:creationId xmlns:p14="http://schemas.microsoft.com/office/powerpoint/2010/main" val="3733614249"/>
+      </p:ext>
+    </p:extLst>
+  </p:cSld>
+  <p:clrMapOvr>
+    <a:masterClrMapping/>
+  </p:clrMapOvr>
+  <p:timing>
+    <p:tnLst>
+      <p:par>
+        <p:cTn id="1" dur="indefinite" restart="never" nodeType="tmRoot"/>
+      </p:par>
+    </p:tnLst>
+  </p:timing>
+</p:sld>
+</file>
+
+<file path=ppt/slides/slide12.xml><?xml version="1.0" encoding="utf-8"?>
+<p:sld xmlns:a="http://schemas.openxmlformats.org/drawingml/2006/main" xmlns:r="http://schemas.openxmlformats.org/officeDocument/2006/relationships" xmlns:p="http://schemas.openxmlformats.org/presentationml/2006/main">
+  <p:cSld>
+    <p:spTree>
+      <p:nvGrpSpPr>
+        <p:cNvPr id="1" name=""/>
+        <p:cNvGrpSpPr/>
+        <p:nvPr/>
+      </p:nvGrpSpPr>
+      <p:grpSpPr>
+        <a:xfrm>
+          <a:off x="0" y="0"/>
+          <a:ext cx="0" cy="0"/>
+          <a:chOff x="0" y="0"/>
+          <a:chExt cx="0" cy="0"/>
+        </a:xfrm>
+      </p:grpSpPr>
+      <p:sp>
+        <p:nvSpPr>
+          <p:cNvPr id="2" name="Title 1"/>
+          <p:cNvSpPr>
+            <a:spLocks noGrp="1"/>
+          </p:cNvSpPr>
+          <p:nvPr>
+            <p:ph type="title"/>
+          </p:nvPr>
+        </p:nvSpPr>
+        <p:spPr/>
+        <p:txBody>
+          <a:bodyPr/>
+          <a:lstStyle/>
+          <a:p>
+            <a:r>
+              <a:rPr lang="en-US" dirty="0" smtClean="0"/>
+              <a:t>Let’s Talk About…</a:t>
+            </a:r>
+            <a:endParaRPr lang="en-US" dirty="0"/>
+          </a:p>
+        </p:txBody>
+      </p:sp>
+      <p:sp>
+        <p:nvSpPr>
+          <p:cNvPr id="3" name="Content Placeholder 2"/>
+          <p:cNvSpPr>
+            <a:spLocks noGrp="1"/>
+          </p:cNvSpPr>
+          <p:nvPr>
+            <p:ph idx="1"/>
+          </p:nvPr>
+        </p:nvSpPr>
+        <p:spPr/>
+        <p:txBody>
+          <a:bodyPr>
+            <a:normAutofit/>
+          </a:bodyPr>
+          <a:lstStyle/>
+          <a:p>
+            <a:pPr marL="0" indent="0" algn="ctr">
+              <a:buNone/>
+            </a:pPr>
+            <a:r>
+              <a:rPr lang="en-US" sz="8000" dirty="0" smtClean="0"/>
+              <a:t>Mutability</a:t>
+            </a:r>
+          </a:p>
+        </p:txBody>
+      </p:sp>
+    </p:spTree>
+    <p:extLst>
+      <p:ext uri="{BB962C8B-B14F-4D97-AF65-F5344CB8AC3E}">
+        <p14:creationId xmlns:p14="http://schemas.microsoft.com/office/powerpoint/2010/main" val="460637592"/>
+      </p:ext>
+    </p:extLst>
+  </p:cSld>
+  <p:clrMapOvr>
+    <a:masterClrMapping/>
+  </p:clrMapOvr>
+  <p:timing>
+    <p:tnLst>
+      <p:par>
+        <p:cTn id="1" dur="indefinite" restart="never" nodeType="tmRoot"/>
+      </p:par>
+    </p:tnLst>
+  </p:timing>
+</p:sld>
+</file>
+
+<file path=ppt/slides/slide13.xml><?xml version="1.0" encoding="utf-8"?>
+<p:sld xmlns:a="http://schemas.openxmlformats.org/drawingml/2006/main" xmlns:r="http://schemas.openxmlformats.org/officeDocument/2006/relationships" xmlns:p="http://schemas.openxmlformats.org/presentationml/2006/main">
+  <p:cSld>
+    <p:spTree>
+      <p:nvGrpSpPr>
+        <p:cNvPr id="1" name=""/>
+        <p:cNvGrpSpPr/>
+        <p:nvPr/>
+      </p:nvGrpSpPr>
+      <p:grpSpPr>
+        <a:xfrm>
+          <a:off x="0" y="0"/>
+          <a:ext cx="0" cy="0"/>
+          <a:chOff x="0" y="0"/>
+          <a:chExt cx="0" cy="0"/>
+        </a:xfrm>
+      </p:grpSpPr>
+      <p:sp>
+        <p:nvSpPr>
+          <p:cNvPr id="2" name="Title 1"/>
+          <p:cNvSpPr>
+            <a:spLocks noGrp="1"/>
+          </p:cNvSpPr>
+          <p:nvPr>
+            <p:ph type="title"/>
+          </p:nvPr>
+        </p:nvSpPr>
+        <p:spPr/>
+        <p:txBody>
+          <a:bodyPr/>
+          <a:lstStyle/>
+          <a:p>
+            <a:r>
+              <a:rPr lang="en-US" dirty="0" smtClean="0"/>
+              <a:t>Mutability</a:t>
+            </a:r>
+            <a:endParaRPr lang="en-US" dirty="0"/>
+          </a:p>
+        </p:txBody>
+      </p:sp>
+      <p:sp>
+        <p:nvSpPr>
+          <p:cNvPr id="3" name="Content Placeholder 2"/>
+          <p:cNvSpPr>
+            <a:spLocks noGrp="1"/>
+          </p:cNvSpPr>
+          <p:nvPr>
+            <p:ph idx="1"/>
+          </p:nvPr>
+        </p:nvSpPr>
+        <p:spPr/>
+        <p:txBody>
+          <a:bodyPr>
+            <a:normAutofit lnSpcReduction="10000"/>
+          </a:bodyPr>
+          <a:lstStyle/>
+          <a:p>
+            <a:r>
+              <a:rPr lang="en-US" dirty="0" smtClean="0"/>
+              <a:t>Change something that exists</a:t>
+            </a:r>
+          </a:p>
+          <a:p>
+            <a:r>
+              <a:rPr lang="en-US" dirty="0" smtClean="0"/>
+              <a:t>In C#...</a:t>
+            </a:r>
+          </a:p>
+          <a:p>
+            <a:pPr marL="0" indent="0">
+              <a:buNone/>
+            </a:pPr>
+            <a:r>
+              <a:rPr lang="en-US" sz="1800" dirty="0" smtClean="0">
+                <a:solidFill>
+                  <a:srgbClr val="0000FF"/>
+                </a:solidFill>
+                <a:latin typeface="Consolas"/>
+              </a:rPr>
+              <a:t>		var</a:t>
+            </a:r>
+            <a:r>
+              <a:rPr lang="en-US" sz="1800" dirty="0" smtClean="0">
+                <a:solidFill>
+                  <a:prstClr val="black"/>
+                </a:solidFill>
+                <a:latin typeface="Consolas"/>
+              </a:rPr>
+              <a:t> </a:t>
+            </a:r>
+            <a:r>
+              <a:rPr lang="en-US" sz="1800" dirty="0">
+                <a:solidFill>
+                  <a:prstClr val="black"/>
+                </a:solidFill>
+                <a:latin typeface="Consolas"/>
+              </a:rPr>
+              <a:t>iAmAMutableLocal = 3;</a:t>
+            </a:r>
+          </a:p>
+          <a:p>
+            <a:pPr marL="0" indent="0">
+              <a:buNone/>
+            </a:pPr>
+            <a:r>
+              <a:rPr lang="en-US" sz="1800" dirty="0" smtClean="0">
+                <a:solidFill>
+                  <a:prstClr val="black"/>
+                </a:solidFill>
+                <a:latin typeface="Consolas"/>
+              </a:rPr>
+              <a:t>		iAmAMutableLocal </a:t>
+            </a:r>
+            <a:r>
+              <a:rPr lang="en-US" sz="1800" dirty="0">
+                <a:solidFill>
+                  <a:prstClr val="black"/>
+                </a:solidFill>
+                <a:latin typeface="Consolas"/>
+              </a:rPr>
+              <a:t>= 7;</a:t>
+            </a:r>
+          </a:p>
+          <a:p>
+            <a:pPr marL="0" indent="0">
+              <a:buNone/>
+            </a:pPr>
+            <a:r>
+              <a:rPr lang="en-US" sz="1800" dirty="0" smtClean="0">
+                <a:solidFill>
+                  <a:srgbClr val="00008B"/>
+                </a:solidFill>
+                <a:latin typeface="Consolas"/>
+              </a:rPr>
+              <a:t>		Console</a:t>
+            </a:r>
+            <a:r>
+              <a:rPr lang="en-US" sz="1800" dirty="0" smtClean="0">
+                <a:solidFill>
+                  <a:prstClr val="black"/>
+                </a:solidFill>
+                <a:latin typeface="Consolas"/>
+              </a:rPr>
+              <a:t>.</a:t>
+            </a:r>
+            <a:r>
+              <a:rPr lang="en-US" sz="1800" dirty="0" smtClean="0">
+                <a:solidFill>
+                  <a:srgbClr val="800080"/>
+                </a:solidFill>
+                <a:latin typeface="Consolas"/>
+              </a:rPr>
+              <a:t>Out</a:t>
+            </a:r>
+            <a:r>
+              <a:rPr lang="en-US" sz="1800" dirty="0" smtClean="0">
+                <a:solidFill>
+                  <a:prstClr val="black"/>
+                </a:solidFill>
+                <a:latin typeface="Consolas"/>
+              </a:rPr>
+              <a:t>.</a:t>
+            </a:r>
+            <a:r>
+              <a:rPr lang="en-US" sz="1800" dirty="0" smtClean="0">
+                <a:solidFill>
+                  <a:srgbClr val="008B8B"/>
+                </a:solidFill>
+                <a:latin typeface="Consolas"/>
+              </a:rPr>
+              <a:t>WriteLine</a:t>
+            </a:r>
+            <a:r>
+              <a:rPr lang="en-US" sz="1800" dirty="0" smtClean="0">
+                <a:solidFill>
+                  <a:prstClr val="black"/>
+                </a:solidFill>
+                <a:latin typeface="Consolas"/>
+              </a:rPr>
+              <a:t>(iAmAMutableLocal</a:t>
+            </a:r>
+            <a:r>
+              <a:rPr lang="en-US" sz="1800" dirty="0">
+                <a:solidFill>
+                  <a:prstClr val="black"/>
+                </a:solidFill>
+                <a:latin typeface="Consolas"/>
+              </a:rPr>
+              <a:t>);</a:t>
+            </a:r>
+          </a:p>
+          <a:p>
+            <a:r>
+              <a:rPr lang="en-US" dirty="0" smtClean="0"/>
+              <a:t>This scenario is </a:t>
+            </a:r>
+            <a:r>
+              <a:rPr lang="en-US" i="1" dirty="0" smtClean="0"/>
+              <a:t>reassignment</a:t>
+            </a:r>
+          </a:p>
+          <a:p>
+            <a:r>
+              <a:rPr lang="en-US" dirty="0" smtClean="0"/>
+              <a:t>In F#...</a:t>
+            </a:r>
+          </a:p>
+          <a:p>
+            <a:pPr marL="0" indent="0">
+              <a:buNone/>
+            </a:pPr>
+            <a:r>
+              <a:rPr lang="en-US" sz="1800" dirty="0" smtClean="0">
+                <a:solidFill>
+                  <a:srgbClr val="0000FF"/>
+                </a:solidFill>
+                <a:latin typeface="Consolas"/>
+              </a:rPr>
+              <a:t>		let</a:t>
+            </a:r>
+            <a:r>
+              <a:rPr lang="en-US" sz="1800" dirty="0" smtClean="0">
+                <a:solidFill>
+                  <a:prstClr val="black"/>
+                </a:solidFill>
+                <a:latin typeface="Consolas"/>
+              </a:rPr>
+              <a:t> </a:t>
+            </a:r>
+            <a:r>
+              <a:rPr lang="en-US" sz="1800" dirty="0">
+                <a:solidFill>
+                  <a:prstClr val="black"/>
+                </a:solidFill>
+                <a:latin typeface="Consolas"/>
+              </a:rPr>
+              <a:t>iAmImmuableLocal = 3</a:t>
+            </a:r>
+          </a:p>
+          <a:p>
+            <a:pPr marL="0" indent="0">
+              <a:buNone/>
+            </a:pPr>
+            <a:r>
+              <a:rPr lang="en-US" sz="1800" dirty="0" smtClean="0">
+                <a:solidFill>
+                  <a:prstClr val="black"/>
+                </a:solidFill>
+                <a:latin typeface="Consolas"/>
+              </a:rPr>
+              <a:t>		iAmImmuableLocal </a:t>
+            </a:r>
+            <a:r>
+              <a:rPr lang="en-US" sz="1800" dirty="0">
+                <a:solidFill>
+                  <a:prstClr val="black"/>
+                </a:solidFill>
+                <a:latin typeface="Consolas"/>
+              </a:rPr>
+              <a:t>&lt;- 9</a:t>
+            </a:r>
+          </a:p>
+          <a:p>
+            <a:pPr marL="0" indent="0">
+              <a:buNone/>
+            </a:pPr>
+            <a:r>
+              <a:rPr lang="en-US" sz="1800" dirty="0" smtClean="0">
+                <a:solidFill>
+                  <a:prstClr val="black"/>
+                </a:solidFill>
+                <a:latin typeface="Consolas"/>
+              </a:rPr>
+              <a:t>		printfn </a:t>
+            </a:r>
+            <a:r>
+              <a:rPr lang="en-US" sz="1800" dirty="0">
+                <a:solidFill>
+                  <a:srgbClr val="800000"/>
+                </a:solidFill>
+                <a:latin typeface="Consolas"/>
+              </a:rPr>
+              <a:t>"%d"</a:t>
+            </a:r>
+            <a:r>
+              <a:rPr lang="en-US" sz="1800" dirty="0">
+                <a:solidFill>
+                  <a:prstClr val="black"/>
+                </a:solidFill>
+                <a:latin typeface="Consolas"/>
+              </a:rPr>
+              <a:t> </a:t>
+            </a:r>
+            <a:r>
+              <a:rPr lang="en-US" sz="1800" dirty="0" smtClean="0">
+                <a:solidFill>
+                  <a:prstClr val="black"/>
+                </a:solidFill>
+                <a:latin typeface="Consolas"/>
+              </a:rPr>
+              <a:t>iAmImmuableLocal</a:t>
+            </a:r>
+            <a:endParaRPr lang="en-US" sz="1800" dirty="0">
+              <a:solidFill>
+                <a:prstClr val="black"/>
+              </a:solidFill>
+              <a:latin typeface="Consolas"/>
+            </a:endParaRPr>
+          </a:p>
+        </p:txBody>
+      </p:sp>
+    </p:spTree>
+    <p:extLst>
+      <p:ext uri="{BB962C8B-B14F-4D97-AF65-F5344CB8AC3E}">
+        <p14:creationId xmlns:p14="http://schemas.microsoft.com/office/powerpoint/2010/main" val="2736747107"/>
+      </p:ext>
+    </p:extLst>
+  </p:cSld>
+  <p:clrMapOvr>
+    <a:masterClrMapping/>
+  </p:clrMapOvr>
+  <p:timing>
+    <p:tnLst>
+      <p:par>
+        <p:cTn id="1" dur="indefinite" restart="never" nodeType="tmRoot"/>
+      </p:par>
+    </p:tnLst>
+  </p:timing>
+</p:sld>
+</file>
+
+<file path=ppt/slides/slide14.xml><?xml version="1.0" encoding="utf-8"?>
+<p:sld xmlns:a="http://schemas.openxmlformats.org/drawingml/2006/main" xmlns:r="http://schemas.openxmlformats.org/officeDocument/2006/relationships" xmlns:p="http://schemas.openxmlformats.org/presentationml/2006/main">
+  <p:cSld>
+    <p:spTree>
+      <p:nvGrpSpPr>
+        <p:cNvPr id="1" name=""/>
+        <p:cNvGrpSpPr/>
+        <p:nvPr/>
+      </p:nvGrpSpPr>
+      <p:grpSpPr>
+        <a:xfrm>
+          <a:off x="0" y="0"/>
+          <a:ext cx="0" cy="0"/>
+          <a:chOff x="0" y="0"/>
+          <a:chExt cx="0" cy="0"/>
+        </a:xfrm>
+      </p:grpSpPr>
+      <p:sp>
+        <p:nvSpPr>
+          <p:cNvPr id="2" name="Title 1"/>
+          <p:cNvSpPr>
+            <a:spLocks noGrp="1"/>
+          </p:cNvSpPr>
+          <p:nvPr>
+            <p:ph type="title"/>
+          </p:nvPr>
+        </p:nvSpPr>
+        <p:spPr/>
+        <p:txBody>
+          <a:bodyPr/>
+          <a:lstStyle/>
+          <a:p>
+            <a:r>
+              <a:rPr lang="en-US" dirty="0" smtClean="0"/>
               <a:t>F# Won’t Compile</a:t>
             </a:r>
             <a:endParaRPr lang="en-US" dirty="0"/>
@@ -3302,8 +4837,19 @@
             </a:r>
             <a:r>
               <a:rPr lang="en-US" dirty="0" smtClean="0"/>
-              <a:t> modifier if you have to.</a:t>
-            </a:r>
+              <a:t> modifier if you have to</a:t>
+            </a:r>
+            <a:r>
+              <a:rPr lang="en-US" dirty="0" smtClean="0"/>
+              <a:t>.</a:t>
+            </a:r>
+          </a:p>
+          <a:p>
+            <a:r>
+              <a:rPr lang="en-US" dirty="0" smtClean="0"/>
+              <a:t>Often needed for compatibility with existing .NET API’s</a:t>
+            </a:r>
+            <a:endParaRPr lang="en-US" dirty="0" smtClean="0"/>
           </a:p>
         </p:txBody>
       </p:sp>
@@ -3327,7 +4873,7 @@
 </p:sld>
 </file>
 
-<file path=ppt/slides/slide11.xml><?xml version="1.0" encoding="utf-8"?>
+<file path=ppt/slides/slide15.xml><?xml version="1.0" encoding="utf-8"?>
 <p:sld xmlns:a="http://schemas.openxmlformats.org/drawingml/2006/main" xmlns:r="http://schemas.openxmlformats.org/officeDocument/2006/relationships" xmlns:p="http://schemas.openxmlformats.org/presentationml/2006/main">
   <p:cSld>
     <p:spTree>
@@ -3535,7 +5081,7 @@
 </p:sld>
 </file>
 
-<file path=ppt/slides/slide12.xml><?xml version="1.0" encoding="utf-8"?>
+<file path=ppt/slides/slide16.xml><?xml version="1.0" encoding="utf-8"?>
 <p:sld xmlns:a="http://schemas.openxmlformats.org/drawingml/2006/main" xmlns:r="http://schemas.openxmlformats.org/officeDocument/2006/relationships" xmlns:p="http://schemas.openxmlformats.org/presentationml/2006/main">
   <p:cSld>
     <p:spTree>
@@ -3592,8 +5138,13 @@
           <a:p>
             <a:r>
               <a:rPr lang="en-US" dirty="0" smtClean="0"/>
-              <a:t>Performance issues</a:t>
-            </a:r>
+              <a:t>Performance </a:t>
+            </a:r>
+            <a:r>
+              <a:rPr lang="en-US" dirty="0" smtClean="0"/>
+              <a:t>issues / memory issues</a:t>
+            </a:r>
+            <a:endParaRPr lang="en-US" dirty="0" smtClean="0"/>
           </a:p>
           <a:p>
             <a:pPr lvl="1"/>
@@ -3605,11 +5156,7 @@
           <a:p>
             <a:r>
               <a:rPr lang="en-US" dirty="0" smtClean="0"/>
-              <a:t>Usually </a:t>
-            </a:r>
-            <a:r>
-              <a:rPr lang="en-US" dirty="0" smtClean="0"/>
-              <a:t>means </a:t>
+              <a:t>Usually means </a:t>
             </a:r>
             <a:r>
               <a:rPr lang="en-US" i="1" dirty="0" smtClean="0"/>
@@ -3645,6 +5192,100 @@
     <p:extLst>
       <p:ext uri="{BB962C8B-B14F-4D97-AF65-F5344CB8AC3E}">
         <p14:creationId xmlns:p14="http://schemas.microsoft.com/office/powerpoint/2010/main" val="3672322297"/>
+      </p:ext>
+    </p:extLst>
+  </p:cSld>
+  <p:clrMapOvr>
+    <a:masterClrMapping/>
+  </p:clrMapOvr>
+  <p:timing>
+    <p:tnLst>
+      <p:par>
+        <p:cTn id="1" dur="indefinite" restart="never" nodeType="tmRoot"/>
+      </p:par>
+    </p:tnLst>
+  </p:timing>
+</p:sld>
+</file>
+
+<file path=ppt/slides/slide17.xml><?xml version="1.0" encoding="utf-8"?>
+<p:sld xmlns:a="http://schemas.openxmlformats.org/drawingml/2006/main" xmlns:r="http://schemas.openxmlformats.org/officeDocument/2006/relationships" xmlns:p="http://schemas.openxmlformats.org/presentationml/2006/main">
+  <p:cSld>
+    <p:spTree>
+      <p:nvGrpSpPr>
+        <p:cNvPr id="1" name=""/>
+        <p:cNvGrpSpPr/>
+        <p:nvPr/>
+      </p:nvGrpSpPr>
+      <p:grpSpPr>
+        <a:xfrm>
+          <a:off x="0" y="0"/>
+          <a:ext cx="0" cy="0"/>
+          <a:chOff x="0" y="0"/>
+          <a:chExt cx="0" cy="0"/>
+        </a:xfrm>
+      </p:grpSpPr>
+      <p:sp>
+        <p:nvSpPr>
+          <p:cNvPr id="2" name="Title 1"/>
+          <p:cNvSpPr>
+            <a:spLocks noGrp="1"/>
+          </p:cNvSpPr>
+          <p:nvPr>
+            <p:ph type="title"/>
+          </p:nvPr>
+        </p:nvSpPr>
+        <p:spPr/>
+        <p:txBody>
+          <a:bodyPr/>
+          <a:lstStyle/>
+          <a:p>
+            <a:r>
+              <a:rPr lang="en-US" dirty="0" smtClean="0"/>
+              <a:t>Why is recursion taboo in C#?</a:t>
+            </a:r>
+            <a:endParaRPr lang="en-US" dirty="0"/>
+          </a:p>
+        </p:txBody>
+      </p:sp>
+      <p:sp>
+        <p:nvSpPr>
+          <p:cNvPr id="3" name="Content Placeholder 2"/>
+          <p:cNvSpPr>
+            <a:spLocks noGrp="1"/>
+          </p:cNvSpPr>
+          <p:nvPr>
+            <p:ph idx="1"/>
+          </p:nvPr>
+        </p:nvSpPr>
+        <p:spPr/>
+        <p:txBody>
+          <a:bodyPr/>
+          <a:lstStyle/>
+          <a:p>
+            <a:r>
+              <a:rPr lang="en-US" dirty="0" err="1" smtClean="0"/>
+              <a:t>StackOverflowException</a:t>
+            </a:r>
+            <a:endParaRPr lang="en-US" dirty="0" smtClean="0"/>
+          </a:p>
+          <a:p>
+            <a:r>
+              <a:rPr lang="en-US" dirty="0" smtClean="0"/>
+              <a:t>Confusing when it isn’t </a:t>
+            </a:r>
+            <a:r>
+              <a:rPr lang="en-US" smtClean="0"/>
+              <a:t>commmon</a:t>
+            </a:r>
+            <a:endParaRPr lang="en-US" dirty="0" smtClean="0"/>
+          </a:p>
+        </p:txBody>
+      </p:sp>
+    </p:spTree>
+    <p:extLst>
+      <p:ext uri="{BB962C8B-B14F-4D97-AF65-F5344CB8AC3E}">
+        <p14:creationId xmlns:p14="http://schemas.microsoft.com/office/powerpoint/2010/main" val="2248734120"/>
       </p:ext>
     </p:extLst>
   </p:cSld>
@@ -3742,11 +5383,7 @@
           <a:p>
             <a:r>
               <a:rPr lang="en-US" dirty="0" smtClean="0"/>
-              <a:t>Test Driven Development / Agile enthusiast</a:t>
-            </a:r>
-            <a:r>
-              <a:rPr lang="en-US" dirty="0" smtClean="0"/>
-              <a:t>.</a:t>
+              <a:t>Test Driven Development / Agile enthusiast.</a:t>
             </a:r>
           </a:p>
           <a:p>
@@ -3787,6 +5424,13 @@
         </p:nvPicPr>
         <p:blipFill>
           <a:blip r:embed="rId2">
+            <a:duotone>
+              <a:schemeClr val="accent1">
+                <a:shade val="45000"/>
+                <a:satMod val="135000"/>
+              </a:schemeClr>
+              <a:prstClr val="white"/>
+            </a:duotone>
             <a:extLst>
               <a:ext uri="{28A0092B-C50C-407E-A947-70E740481C1C}">
                 <a14:useLocalDpi xmlns:a14="http://schemas.microsoft.com/office/drawing/2010/main" val="0"/>
@@ -3799,13 +5443,27 @@
         </p:blipFill>
         <p:spPr>
           <a:xfrm>
-            <a:off x="6324600" y="1600200"/>
+            <a:off x="6324600" y="2006600"/>
             <a:ext cx="2184400" cy="2184400"/>
           </a:xfrm>
           <a:prstGeom prst="rect">
             <a:avLst/>
           </a:prstGeom>
         </p:spPr>
+        <p:style>
+          <a:lnRef idx="1">
+            <a:schemeClr val="dk1"/>
+          </a:lnRef>
+          <a:fillRef idx="2">
+            <a:schemeClr val="dk1"/>
+          </a:fillRef>
+          <a:effectRef idx="1">
+            <a:schemeClr val="dk1"/>
+          </a:effectRef>
+          <a:fontRef idx="minor">
+            <a:schemeClr val="dk1"/>
+          </a:fontRef>
+        </p:style>
       </p:pic>
     </p:spTree>
     <p:extLst>
@@ -3991,7 +5649,9 @@
         </p:nvSpPr>
         <p:spPr/>
         <p:txBody>
-          <a:bodyPr/>
+          <a:bodyPr>
+            <a:normAutofit fontScale="92500" lnSpcReduction="10000"/>
+          </a:bodyPr>
           <a:lstStyle/>
           <a:p>
             <a:r>
@@ -4044,6 +5704,13 @@
   <p:clrMapOvr>
     <a:masterClrMapping/>
   </p:clrMapOvr>
+  <p:timing>
+    <p:tnLst>
+      <p:par>
+        <p:cTn id="1" dur="indefinite" restart="never" nodeType="tmRoot"/>
+      </p:par>
+    </p:tnLst>
+  </p:timing>
 </p:sld>
 </file>
 
@@ -4477,7 +6144,7 @@
           <a:p>
             <a:r>
               <a:rPr lang="en-US" dirty="0" smtClean="0"/>
-              <a:t>Let’s Talk About…</a:t>
+              <a:t>Reviewing C#</a:t>
             </a:r>
             <a:endParaRPr lang="en-US" dirty="0"/>
           </a:p>
@@ -4496,22 +6163,73 @@
         <p:spPr/>
         <p:txBody>
           <a:bodyPr>
-            <a:normAutofit/>
+            <a:normAutofit lnSpcReduction="10000"/>
           </a:bodyPr>
           <a:lstStyle/>
           <a:p>
             <a:r>
-              <a:rPr lang="en-US" sz="8000" dirty="0" smtClean="0"/>
-              <a:t>Mutability</a:t>
-            </a:r>
-            <a:endParaRPr lang="en-US" sz="8000" dirty="0" smtClean="0"/>
+              <a:rPr lang="en-US" dirty="0" smtClean="0"/>
+              <a:t>Heavy focus on Object Oriented</a:t>
+            </a:r>
+          </a:p>
+          <a:p>
+            <a:r>
+              <a:rPr lang="en-US" dirty="0" smtClean="0"/>
+              <a:t>Not designed for heavy recursion</a:t>
+            </a:r>
+          </a:p>
+          <a:p>
+            <a:r>
+              <a:rPr lang="en-US" dirty="0" smtClean="0"/>
+              <a:t>Common recursive operations</a:t>
+            </a:r>
+          </a:p>
+          <a:p>
+            <a:pPr lvl="1"/>
+            <a:r>
+              <a:rPr lang="en-US" dirty="0" smtClean="0"/>
+              <a:t>for</a:t>
+            </a:r>
+          </a:p>
+          <a:p>
+            <a:pPr lvl="1"/>
+            <a:r>
+              <a:rPr lang="en-US" dirty="0" err="1" smtClean="0"/>
+              <a:t>foreach</a:t>
+            </a:r>
+            <a:endParaRPr lang="en-US" dirty="0" smtClean="0"/>
+          </a:p>
+          <a:p>
+            <a:pPr lvl="1"/>
+            <a:r>
+              <a:rPr lang="en-US" dirty="0" smtClean="0"/>
+              <a:t>while / do + while</a:t>
+            </a:r>
+          </a:p>
+          <a:p>
+            <a:pPr lvl="1"/>
+            <a:r>
+              <a:rPr lang="en-US" dirty="0" err="1" smtClean="0"/>
+              <a:t>goto</a:t>
+            </a:r>
+            <a:r>
+              <a:rPr lang="en-US" dirty="0" smtClean="0"/>
+              <a:t> (yuck!)</a:t>
+            </a:r>
+          </a:p>
+          <a:p>
+            <a:r>
+              <a:rPr lang="en-US" dirty="0" smtClean="0"/>
+              <a:t>Let’s see a common example</a:t>
+            </a:r>
+            <a:endParaRPr lang="en-US" dirty="0"/>
           </a:p>
         </p:txBody>
       </p:sp>
     </p:spTree>
     <p:extLst>
       <p:ext uri="{BB962C8B-B14F-4D97-AF65-F5344CB8AC3E}">
-        <p14:creationId xmlns:p14="http://schemas.microsoft.com/office/powerpoint/2010/main" val="460637592"/>
+        <p14:creationId xmlns:p14="http://schemas.microsoft.com/office/powerpoint/2010/main" val="3343262608"/>
       </p:ext>
     </p:extLst>
   </p:cSld>
@@ -4562,7 +6280,7 @@
           <a:p>
             <a:r>
               <a:rPr lang="en-US" dirty="0" smtClean="0"/>
-              <a:t>Mutability</a:t>
+              <a:t>Reviewing C# Loops</a:t>
             </a:r>
             <a:endParaRPr lang="en-US" dirty="0"/>
           </a:p>
@@ -4580,274 +6298,53 @@
         </p:nvSpPr>
         <p:spPr/>
         <p:txBody>
-          <a:bodyPr>
-            <a:normAutofit/>
-          </a:bodyPr>
-          <a:lstStyle/>
-          <a:p>
-            <a:r>
-              <a:rPr lang="en-US" dirty="0" smtClean="0"/>
-              <a:t>Change something that </a:t>
-            </a:r>
-            <a:r>
-              <a:rPr lang="en-US" dirty="0" smtClean="0"/>
-              <a:t>exists</a:t>
-            </a:r>
-            <a:endParaRPr lang="en-US" dirty="0" smtClean="0"/>
-          </a:p>
-          <a:p>
-            <a:r>
-              <a:rPr lang="en-US" dirty="0" smtClean="0"/>
-              <a:t>In C#...</a:t>
-            </a:r>
-          </a:p>
-          <a:p>
-            <a:pPr marL="0" indent="0">
-              <a:buNone/>
-            </a:pPr>
-            <a:r>
-              <a:rPr lang="en-US" sz="1800" dirty="0" smtClean="0">
-                <a:solidFill>
-                  <a:srgbClr val="0000FF"/>
-                </a:solidFill>
-                <a:latin typeface="Consolas"/>
-              </a:rPr>
-              <a:t>		var</a:t>
-            </a:r>
-            <a:r>
-              <a:rPr lang="en-US" sz="1800" dirty="0" smtClean="0">
-                <a:solidFill>
-                  <a:prstClr val="black"/>
-                </a:solidFill>
-                <a:latin typeface="Consolas"/>
-              </a:rPr>
-              <a:t> </a:t>
-            </a:r>
-            <a:r>
-              <a:rPr lang="en-US" sz="1800" dirty="0">
-                <a:solidFill>
-                  <a:prstClr val="black"/>
-                </a:solidFill>
-                <a:latin typeface="Consolas"/>
-              </a:rPr>
-              <a:t>iAmAMutableLocal = 3;</a:t>
-            </a:r>
-          </a:p>
-          <a:p>
-            <a:pPr marL="0" indent="0">
-              <a:buNone/>
-            </a:pPr>
-            <a:r>
-              <a:rPr lang="en-US" sz="1800" dirty="0" smtClean="0">
-                <a:solidFill>
-                  <a:prstClr val="black"/>
-                </a:solidFill>
-                <a:latin typeface="Consolas"/>
-              </a:rPr>
-              <a:t>		iAmAMutableLocal </a:t>
-            </a:r>
-            <a:r>
-              <a:rPr lang="en-US" sz="1800" dirty="0">
-                <a:solidFill>
-                  <a:prstClr val="black"/>
-                </a:solidFill>
-                <a:latin typeface="Consolas"/>
-              </a:rPr>
-              <a:t>= 7;</a:t>
-            </a:r>
-          </a:p>
-          <a:p>
-            <a:pPr marL="0" indent="0">
-              <a:buNone/>
-            </a:pPr>
-            <a:r>
-              <a:rPr lang="en-US" sz="1800" dirty="0" smtClean="0">
-                <a:solidFill>
-                  <a:srgbClr val="00008B"/>
-                </a:solidFill>
-                <a:latin typeface="Consolas"/>
-              </a:rPr>
-              <a:t>		Console</a:t>
-            </a:r>
-            <a:r>
-              <a:rPr lang="en-US" sz="1800" dirty="0" smtClean="0">
-                <a:solidFill>
-                  <a:prstClr val="black"/>
-                </a:solidFill>
-                <a:latin typeface="Consolas"/>
-              </a:rPr>
+          <a:bodyPr/>
+          <a:lstStyle/>
+          <a:p>
+            <a:r>
+              <a:rPr lang="en-US" dirty="0" smtClean="0"/>
+              <a:t>Let’s look at </a:t>
+            </a:r>
+            <a:r>
+              <a:rPr lang="en-US" dirty="0" smtClean="0"/>
+              <a:t>four examples</a:t>
+            </a:r>
+            <a:r>
+              <a:rPr lang="en-US" dirty="0" smtClean="0"/>
               <a:t>.</a:t>
             </a:r>
-            <a:r>
-              <a:rPr lang="en-US" sz="1800" dirty="0" smtClean="0">
-                <a:solidFill>
-                  <a:srgbClr val="800080"/>
-                </a:solidFill>
-                <a:latin typeface="Consolas"/>
-              </a:rPr>
-              <a:t>Out</a:t>
-            </a:r>
-            <a:r>
-              <a:rPr lang="en-US" sz="1800" dirty="0" smtClean="0">
-                <a:solidFill>
-                  <a:prstClr val="black"/>
-                </a:solidFill>
-                <a:latin typeface="Consolas"/>
-              </a:rPr>
-              <a:t>.</a:t>
-            </a:r>
-            <a:r>
-              <a:rPr lang="en-US" sz="1800" dirty="0" smtClean="0">
-                <a:solidFill>
-                  <a:srgbClr val="008B8B"/>
-                </a:solidFill>
-                <a:latin typeface="Consolas"/>
-              </a:rPr>
-              <a:t>WriteLine</a:t>
-            </a:r>
-            <a:r>
-              <a:rPr lang="en-US" sz="1800" dirty="0" smtClean="0">
-                <a:solidFill>
-                  <a:prstClr val="black"/>
-                </a:solidFill>
-                <a:latin typeface="Consolas"/>
-              </a:rPr>
-              <a:t>(iAmAMutableLocal</a:t>
-            </a:r>
-            <a:r>
-              <a:rPr lang="en-US" sz="1800" dirty="0">
-                <a:solidFill>
-                  <a:prstClr val="black"/>
-                </a:solidFill>
-                <a:latin typeface="Consolas"/>
-              </a:rPr>
-              <a:t>);</a:t>
-            </a:r>
-          </a:p>
-          <a:p>
-            <a:r>
-              <a:rPr lang="en-US" dirty="0" smtClean="0"/>
-              <a:t>This scenario is </a:t>
-            </a:r>
-            <a:r>
-              <a:rPr lang="en-US" i="1" dirty="0" smtClean="0"/>
-              <a:t>reassignment</a:t>
-            </a:r>
-          </a:p>
-          <a:p>
-            <a:r>
-              <a:rPr lang="en-US" dirty="0" smtClean="0"/>
-              <a:t>In F#...</a:t>
-            </a:r>
-          </a:p>
-          <a:p>
-            <a:pPr marL="0" indent="0">
-              <a:buNone/>
-            </a:pPr>
-            <a:r>
-              <a:rPr lang="en-US" sz="1800" dirty="0" smtClean="0">
-                <a:solidFill>
-                  <a:srgbClr val="0000FF"/>
-                </a:solidFill>
-                <a:latin typeface="Consolas"/>
-              </a:rPr>
-              <a:t>		let</a:t>
-            </a:r>
-            <a:r>
-              <a:rPr lang="en-US" sz="1800" dirty="0" smtClean="0">
-                <a:solidFill>
-                  <a:prstClr val="black"/>
-                </a:solidFill>
-                <a:latin typeface="Consolas"/>
-              </a:rPr>
-              <a:t> </a:t>
-            </a:r>
-            <a:r>
-              <a:rPr lang="en-US" sz="1800" dirty="0">
-                <a:solidFill>
-                  <a:prstClr val="black"/>
-                </a:solidFill>
-                <a:latin typeface="Consolas"/>
-              </a:rPr>
-              <a:t>iAmImmuableLocal = 3</a:t>
-            </a:r>
-          </a:p>
-          <a:p>
-            <a:pPr marL="0" indent="0">
-              <a:buNone/>
-            </a:pPr>
-            <a:r>
-              <a:rPr lang="en-US" sz="1800" dirty="0" smtClean="0">
-                <a:solidFill>
-                  <a:prstClr val="black"/>
-                </a:solidFill>
-                <a:latin typeface="Consolas"/>
-              </a:rPr>
-              <a:t>		iAmImmuableLocal </a:t>
-            </a:r>
-            <a:r>
-              <a:rPr lang="en-US" sz="1800" dirty="0">
-                <a:solidFill>
-                  <a:prstClr val="black"/>
-                </a:solidFill>
-                <a:latin typeface="Consolas"/>
-              </a:rPr>
-              <a:t>&lt;- 9</a:t>
-            </a:r>
-          </a:p>
-          <a:p>
-            <a:pPr marL="0" indent="0">
-              <a:buNone/>
-            </a:pPr>
-            <a:r>
-              <a:rPr lang="en-US" sz="1800" dirty="0" smtClean="0">
-                <a:solidFill>
-                  <a:prstClr val="black"/>
-                </a:solidFill>
-                <a:latin typeface="Consolas"/>
-              </a:rPr>
-              <a:t>		printfn </a:t>
-            </a:r>
-            <a:r>
-              <a:rPr lang="en-US" sz="1800" dirty="0">
-                <a:solidFill>
-                  <a:srgbClr val="800000"/>
-                </a:solidFill>
-                <a:latin typeface="Consolas"/>
-              </a:rPr>
-              <a:t>"%d"</a:t>
-            </a:r>
-            <a:r>
-              <a:rPr lang="en-US" sz="1800" dirty="0">
-                <a:solidFill>
-                  <a:prstClr val="black"/>
-                </a:solidFill>
-                <a:latin typeface="Consolas"/>
-              </a:rPr>
-              <a:t> </a:t>
-            </a:r>
-            <a:r>
-              <a:rPr lang="en-US" sz="1800" dirty="0" smtClean="0">
-                <a:solidFill>
-                  <a:prstClr val="black"/>
-                </a:solidFill>
-                <a:latin typeface="Consolas"/>
-              </a:rPr>
-              <a:t>iAmImmuableLocal</a:t>
-            </a:r>
-            <a:endParaRPr lang="en-US" sz="1800" dirty="0">
-              <a:solidFill>
-                <a:prstClr val="black"/>
-              </a:solidFill>
-              <a:latin typeface="Consolas"/>
-            </a:endParaRPr>
+          </a:p>
+          <a:p>
+            <a:r>
+              <a:rPr lang="en-US" dirty="0" smtClean="0"/>
+              <a:t>Which one is your favorite?</a:t>
+            </a:r>
+          </a:p>
+          <a:p>
+            <a:r>
+              <a:rPr lang="en-US" dirty="0" smtClean="0"/>
+              <a:t>Which do you dislike?</a:t>
+            </a:r>
+          </a:p>
+          <a:p>
+            <a:r>
+              <a:rPr lang="en-US" dirty="0" smtClean="0"/>
+              <a:t>What other ways can this be done?</a:t>
+            </a:r>
+          </a:p>
+          <a:p>
+            <a:r>
+              <a:rPr lang="en-US" dirty="0" smtClean="0"/>
+              <a:t>Discuss. No – really.</a:t>
+            </a:r>
+            <a:endParaRPr lang="en-US" dirty="0"/>
           </a:p>
         </p:txBody>
       </p:sp>
     </p:spTree>
     <p:extLst>
       <p:ext uri="{BB962C8B-B14F-4D97-AF65-F5344CB8AC3E}">
-        <p14:creationId xmlns:p14="http://schemas.microsoft.com/office/powerpoint/2010/main" val="2736747107"/>
+        <p14:creationId xmlns:p14="http://schemas.microsoft.com/office/powerpoint/2010/main" val="587408853"/>
       </p:ext>
     </p:extLst>
   </p:cSld>
@@ -4865,7 +6362,7 @@
 </file>
 
 <file path=ppt/theme/theme1.xml><?xml version="1.0" encoding="utf-8"?>
-<a:theme xmlns:a="http://schemas.openxmlformats.org/drawingml/2006/main" name="Office Theme">
+<a:theme xmlns:a="http://schemas.openxmlformats.org/drawingml/2006/main" name="Thycotic">
   <a:themeElements>
     <a:clrScheme name="Office">
       <a:dk1>
@@ -4939,7 +6436,6 @@
         <a:font script="Mong" typeface="Mongolian Baiti"/>
         <a:font script="Viet" typeface="Times New Roman"/>
         <a:font script="Uigh" typeface="Microsoft Uighur"/>
-        <a:font script="Geor" typeface="Sylfaen"/>
       </a:majorFont>
       <a:minorFont>
         <a:latin typeface="Calibri"/>
@@ -4974,7 +6470,6 @@
         <a:font script="Mong" typeface="Mongolian Baiti"/>
         <a:font script="Viet" typeface="Arial"/>
         <a:font script="Uigh" typeface="Microsoft Uighur"/>
-        <a:font script="Geor" typeface="Sylfaen"/>
       </a:minorFont>
     </a:fontScheme>
     <a:fmtScheme name="Office">

</xml_diff>